<commit_message>
fix bugs and final model
</commit_message>
<xml_diff>
--- a/In Drive Coupon Recommendation.pptx
+++ b/In Drive Coupon Recommendation.pptx
@@ -30,9 +30,10 @@
     <p:sldId id="279" r:id="rId24"/>
     <p:sldId id="280" r:id="rId25"/>
     <p:sldId id="281" r:id="rId26"/>
-    <p:sldId id="282" r:id="rId27"/>
-    <p:sldId id="283" r:id="rId28"/>
-    <p:sldId id="284" r:id="rId29"/>
+    <p:sldId id="285" r:id="rId27"/>
+    <p:sldId id="282" r:id="rId28"/>
+    <p:sldId id="283" r:id="rId29"/>
+    <p:sldId id="284" r:id="rId30"/>
   </p:sldIdLst>
   <p:sldSz cx="12192000" cy="6858000"/>
   <p:notesSz cx="6858000" cy="9144000"/>
@@ -6210,7 +6211,6 @@
               <a:rPr lang="en-IN" dirty="0" smtClean="0"/>
               <a:t>I considered below 21 as 20 and 50plus as 51 and converted this feature into numeric.</a:t>
             </a:r>
-            <a:endParaRPr lang="en-IN" dirty="0" smtClean="0"/>
           </a:p>
         </p:txBody>
       </p:sp>
@@ -6503,7 +6503,6 @@
               <a:rPr lang="en-IN" dirty="0" smtClean="0"/>
               <a:t>I used One-Hot Encoding for this feature</a:t>
             </a:r>
-            <a:endParaRPr lang="en-IN" dirty="0" smtClean="0"/>
           </a:p>
         </p:txBody>
       </p:sp>
@@ -7605,7 +7604,6 @@
               <a:rPr lang="en-IN" dirty="0" smtClean="0"/>
               <a:t>I have used Label encoder for these features.</a:t>
             </a:r>
-            <a:endParaRPr lang="en-IN" dirty="0" smtClean="0"/>
           </a:p>
         </p:txBody>
       </p:sp>
@@ -12073,89 +12071,6 @@
           </a:p>
         </p:txBody>
       </p:sp>
-      <p:pic>
-        <p:nvPicPr>
-          <p:cNvPr id="5" name="Picture 4"/>
-          <p:cNvPicPr>
-            <a:picLocks noChangeAspect="1"/>
-          </p:cNvPicPr>
-          <p:nvPr/>
-        </p:nvPicPr>
-        <p:blipFill rotWithShape="1">
-          <a:blip r:embed="rId2"/>
-          <a:srcRect r="41255"/>
-          <a:stretch/>
-        </p:blipFill>
-        <p:spPr>
-          <a:xfrm>
-            <a:off x="105568" y="1178560"/>
-            <a:ext cx="4324746" cy="3025210"/>
-          </a:xfrm>
-          <a:prstGeom prst="rect">
-            <a:avLst/>
-          </a:prstGeom>
-        </p:spPr>
-      </p:pic>
-      <p:pic>
-        <p:nvPicPr>
-          <p:cNvPr id="7" name="Picture 6"/>
-          <p:cNvPicPr>
-            <a:picLocks noChangeAspect="1"/>
-          </p:cNvPicPr>
-          <p:nvPr/>
-        </p:nvPicPr>
-        <p:blipFill>
-          <a:blip r:embed="rId3">
-            <a:extLst>
-              <a:ext uri="{28A0092B-C50C-407E-A947-70E740481C1C}">
-                <a14:useLocalDpi xmlns:a14="http://schemas.microsoft.com/office/drawing/2010/main" val="0"/>
-              </a:ext>
-            </a:extLst>
-          </a:blip>
-          <a:stretch>
-            <a:fillRect/>
-          </a:stretch>
-        </p:blipFill>
-        <p:spPr>
-          <a:xfrm>
-            <a:off x="105568" y="4139912"/>
-            <a:ext cx="4430313" cy="2718088"/>
-          </a:xfrm>
-          <a:prstGeom prst="rect">
-            <a:avLst/>
-          </a:prstGeom>
-        </p:spPr>
-      </p:pic>
-      <p:pic>
-        <p:nvPicPr>
-          <p:cNvPr id="8" name="Picture 7"/>
-          <p:cNvPicPr>
-            <a:picLocks noChangeAspect="1"/>
-          </p:cNvPicPr>
-          <p:nvPr/>
-        </p:nvPicPr>
-        <p:blipFill>
-          <a:blip r:embed="rId4">
-            <a:extLst>
-              <a:ext uri="{28A0092B-C50C-407E-A947-70E740481C1C}">
-                <a14:useLocalDpi xmlns:a14="http://schemas.microsoft.com/office/drawing/2010/main" val="0"/>
-              </a:ext>
-            </a:extLst>
-          </a:blip>
-          <a:stretch>
-            <a:fillRect/>
-          </a:stretch>
-        </p:blipFill>
-        <p:spPr>
-          <a:xfrm>
-            <a:off x="5212392" y="2862064"/>
-            <a:ext cx="5212090" cy="3995936"/>
-          </a:xfrm>
-          <a:prstGeom prst="rect">
-            <a:avLst/>
-          </a:prstGeom>
-        </p:spPr>
-      </p:pic>
       <p:sp>
         <p:nvSpPr>
           <p:cNvPr id="10" name="Content Placeholder 2"/>
@@ -12166,7 +12081,7 @@
         </p:nvSpPr>
         <p:spPr>
           <a:xfrm>
-            <a:off x="5212392" y="720465"/>
+            <a:off x="6357798" y="657630"/>
             <a:ext cx="4905537" cy="3181553"/>
           </a:xfrm>
           <a:prstGeom prst="rect">
@@ -12433,10 +12348,93 @@
               <a:rPr lang="en-IN" dirty="0" smtClean="0"/>
               <a:t>Overall model is ok.</a:t>
             </a:r>
-            <a:endParaRPr lang="en-IN" dirty="0" smtClean="0"/>
           </a:p>
         </p:txBody>
       </p:sp>
+      <p:pic>
+        <p:nvPicPr>
+          <p:cNvPr id="3" name="Picture 2"/>
+          <p:cNvPicPr>
+            <a:picLocks noChangeAspect="1"/>
+          </p:cNvPicPr>
+          <p:nvPr/>
+        </p:nvPicPr>
+        <p:blipFill>
+          <a:blip r:embed="rId2"/>
+          <a:stretch>
+            <a:fillRect/>
+          </a:stretch>
+        </p:blipFill>
+        <p:spPr>
+          <a:xfrm>
+            <a:off x="350411" y="789628"/>
+            <a:ext cx="4751941" cy="2986722"/>
+          </a:xfrm>
+          <a:prstGeom prst="rect">
+            <a:avLst/>
+          </a:prstGeom>
+        </p:spPr>
+      </p:pic>
+      <p:pic>
+        <p:nvPicPr>
+          <p:cNvPr id="4" name="Picture 3"/>
+          <p:cNvPicPr>
+            <a:picLocks noChangeAspect="1"/>
+          </p:cNvPicPr>
+          <p:nvPr/>
+        </p:nvPicPr>
+        <p:blipFill>
+          <a:blip r:embed="rId3">
+            <a:extLst>
+              <a:ext uri="{28A0092B-C50C-407E-A947-70E740481C1C}">
+                <a14:useLocalDpi xmlns:a14="http://schemas.microsoft.com/office/drawing/2010/main" val="0"/>
+              </a:ext>
+            </a:extLst>
+          </a:blip>
+          <a:stretch>
+            <a:fillRect/>
+          </a:stretch>
+        </p:blipFill>
+        <p:spPr>
+          <a:xfrm>
+            <a:off x="5788877" y="2862064"/>
+            <a:ext cx="5212090" cy="3995936"/>
+          </a:xfrm>
+          <a:prstGeom prst="rect">
+            <a:avLst/>
+          </a:prstGeom>
+        </p:spPr>
+      </p:pic>
+      <p:pic>
+        <p:nvPicPr>
+          <p:cNvPr id="6" name="Picture 5"/>
+          <p:cNvPicPr>
+            <a:picLocks noChangeAspect="1"/>
+          </p:cNvPicPr>
+          <p:nvPr/>
+        </p:nvPicPr>
+        <p:blipFill>
+          <a:blip r:embed="rId4">
+            <a:extLst>
+              <a:ext uri="{28A0092B-C50C-407E-A947-70E740481C1C}">
+                <a14:useLocalDpi xmlns:a14="http://schemas.microsoft.com/office/drawing/2010/main" val="0"/>
+              </a:ext>
+            </a:extLst>
+          </a:blip>
+          <a:stretch>
+            <a:fillRect/>
+          </a:stretch>
+        </p:blipFill>
+        <p:spPr>
+          <a:xfrm>
+            <a:off x="167197" y="3776350"/>
+            <a:ext cx="5074151" cy="3081650"/>
+          </a:xfrm>
+          <a:prstGeom prst="rect">
+            <a:avLst/>
+          </a:prstGeom>
+        </p:spPr>
+      </p:pic>
     </p:spTree>
     <p:extLst>
       <p:ext uri="{BB962C8B-B14F-4D97-AF65-F5344CB8AC3E}">
@@ -12481,7 +12479,7 @@
                                           </p:stCondLst>
                                         </p:cTn>
                                         <p:tgtEl>
-                                          <p:spTgt spid="5"/>
+                                          <p:spTgt spid="3"/>
                                         </p:tgtEl>
                                         <p:attrNameLst>
                                           <p:attrName>style.visibility</p:attrName>
@@ -12495,7 +12493,7 @@
                                       <p:cBhvr additive="base">
                                         <p:cTn id="7" dur="500" fill="hold"/>
                                         <p:tgtEl>
-                                          <p:spTgt spid="5"/>
+                                          <p:spTgt spid="3"/>
                                         </p:tgtEl>
                                         <p:attrNameLst>
                                           <p:attrName>ppt_x</p:attrName>
@@ -12518,7 +12516,7 @@
                                       <p:cBhvr additive="base">
                                         <p:cTn id="8" dur="500" fill="hold"/>
                                         <p:tgtEl>
-                                          <p:spTgt spid="5"/>
+                                          <p:spTgt spid="3"/>
                                         </p:tgtEl>
                                         <p:attrNameLst>
                                           <p:attrName>ppt_y</p:attrName>
@@ -12572,7 +12570,7 @@
                                           </p:stCondLst>
                                         </p:cTn>
                                         <p:tgtEl>
-                                          <p:spTgt spid="7"/>
+                                          <p:spTgt spid="6"/>
                                         </p:tgtEl>
                                         <p:attrNameLst>
                                           <p:attrName>style.visibility</p:attrName>
@@ -12586,7 +12584,7 @@
                                       <p:cBhvr additive="base">
                                         <p:cTn id="13" dur="500" fill="hold"/>
                                         <p:tgtEl>
-                                          <p:spTgt spid="7"/>
+                                          <p:spTgt spid="6"/>
                                         </p:tgtEl>
                                         <p:attrNameLst>
                                           <p:attrName>ppt_x</p:attrName>
@@ -12609,7 +12607,7 @@
                                       <p:cBhvr additive="base">
                                         <p:cTn id="14" dur="500" fill="hold"/>
                                         <p:tgtEl>
-                                          <p:spTgt spid="7"/>
+                                          <p:spTgt spid="6"/>
                                         </p:tgtEl>
                                         <p:attrNameLst>
                                           <p:attrName>ppt_y</p:attrName>
@@ -12663,7 +12661,7 @@
                                           </p:stCondLst>
                                         </p:cTn>
                                         <p:tgtEl>
-                                          <p:spTgt spid="8"/>
+                                          <p:spTgt spid="4"/>
                                         </p:tgtEl>
                                         <p:attrNameLst>
                                           <p:attrName>style.visibility</p:attrName>
@@ -12677,7 +12675,7 @@
                                       <p:cBhvr additive="base">
                                         <p:cTn id="19" dur="500" fill="hold"/>
                                         <p:tgtEl>
-                                          <p:spTgt spid="8"/>
+                                          <p:spTgt spid="4"/>
                                         </p:tgtEl>
                                         <p:attrNameLst>
                                           <p:attrName>ppt_x</p:attrName>
@@ -12700,7 +12698,7 @@
                                       <p:cBhvr additive="base">
                                         <p:cTn id="20" dur="500" fill="hold"/>
                                         <p:tgtEl>
-                                          <p:spTgt spid="8"/>
+                                          <p:spTgt spid="4"/>
                                         </p:tgtEl>
                                         <p:attrNameLst>
                                           <p:attrName>ppt_y</p:attrName>
@@ -13265,7 +13263,7 @@
       </p:par>
     </p:tnLst>
     <p:bldLst>
-      <p:bldP spid="10" grpId="0" uiExpand="1" build="p"/>
+      <p:bldP spid="10" grpId="0" build="p"/>
     </p:bldLst>
   </p:timing>
 </p:sld>
@@ -13316,90 +13314,6 @@
           </a:p>
         </p:txBody>
       </p:sp>
-      <p:pic>
-        <p:nvPicPr>
-          <p:cNvPr id="3" name="Picture 2"/>
-          <p:cNvPicPr>
-            <a:picLocks noChangeAspect="1"/>
-          </p:cNvPicPr>
-          <p:nvPr/>
-        </p:nvPicPr>
-        <p:blipFill>
-          <a:blip r:embed="rId2"/>
-          <a:stretch>
-            <a:fillRect/>
-          </a:stretch>
-        </p:blipFill>
-        <p:spPr>
-          <a:xfrm>
-            <a:off x="567978" y="825282"/>
-            <a:ext cx="4328535" cy="3368332"/>
-          </a:xfrm>
-          <a:prstGeom prst="rect">
-            <a:avLst/>
-          </a:prstGeom>
-        </p:spPr>
-      </p:pic>
-      <p:pic>
-        <p:nvPicPr>
-          <p:cNvPr id="4" name="Picture 3"/>
-          <p:cNvPicPr>
-            <a:picLocks noChangeAspect="1"/>
-          </p:cNvPicPr>
-          <p:nvPr/>
-        </p:nvPicPr>
-        <p:blipFill>
-          <a:blip r:embed="rId3">
-            <a:extLst>
-              <a:ext uri="{28A0092B-C50C-407E-A947-70E740481C1C}">
-                <a14:useLocalDpi xmlns:a14="http://schemas.microsoft.com/office/drawing/2010/main" val="0"/>
-              </a:ext>
-            </a:extLst>
-          </a:blip>
-          <a:stretch>
-            <a:fillRect/>
-          </a:stretch>
-        </p:blipFill>
-        <p:spPr>
-          <a:xfrm>
-            <a:off x="567978" y="4258681"/>
-            <a:ext cx="4236727" cy="2599319"/>
-          </a:xfrm>
-          <a:prstGeom prst="rect">
-            <a:avLst/>
-          </a:prstGeom>
-        </p:spPr>
-      </p:pic>
-      <p:pic>
-        <p:nvPicPr>
-          <p:cNvPr id="6" name="Picture 5"/>
-          <p:cNvPicPr>
-            <a:picLocks noChangeAspect="1"/>
-          </p:cNvPicPr>
-          <p:nvPr/>
-        </p:nvPicPr>
-        <p:blipFill>
-          <a:blip r:embed="rId4">
-            <a:extLst>
-              <a:ext uri="{28A0092B-C50C-407E-A947-70E740481C1C}">
-                <a14:useLocalDpi xmlns:a14="http://schemas.microsoft.com/office/drawing/2010/main" val="0"/>
-              </a:ext>
-            </a:extLst>
-          </a:blip>
-          <a:stretch>
-            <a:fillRect/>
-          </a:stretch>
-        </p:blipFill>
-        <p:spPr>
-          <a:xfrm>
-            <a:off x="5763758" y="3221930"/>
-            <a:ext cx="4742698" cy="3636069"/>
-          </a:xfrm>
-          <a:prstGeom prst="rect">
-            <a:avLst/>
-          </a:prstGeom>
-        </p:spPr>
-      </p:pic>
       <p:sp>
         <p:nvSpPr>
           <p:cNvPr id="9" name="Content Placeholder 2"/>
@@ -13410,7 +13324,7 @@
         </p:nvSpPr>
         <p:spPr>
           <a:xfrm>
-            <a:off x="5763758" y="729401"/>
+            <a:off x="5763758" y="701969"/>
             <a:ext cx="4905537" cy="3181553"/>
           </a:xfrm>
           <a:prstGeom prst="rect">
@@ -13651,7 +13565,15 @@
           <a:p>
             <a:r>
               <a:rPr lang="en-IN" dirty="0" smtClean="0"/>
-              <a:t>We are getting 63% train accuracy and 61.7% Test accuracy.</a:t>
+              <a:t>We are getting 63% train accuracy and </a:t>
+            </a:r>
+            <a:r>
+              <a:rPr lang="en-IN" dirty="0" smtClean="0"/>
+              <a:t>62.2% </a:t>
+            </a:r>
+            <a:r>
+              <a:rPr lang="en-IN" dirty="0" smtClean="0"/>
+              <a:t>Test accuracy.</a:t>
             </a:r>
           </a:p>
           <a:p>
@@ -13663,8 +13585,13 @@
           <a:p>
             <a:r>
               <a:rPr lang="en-IN" dirty="0" smtClean="0"/>
-              <a:t>AUC is 67%.</a:t>
+              <a:t>AUC is </a:t>
             </a:r>
+            <a:r>
+              <a:rPr lang="en-IN" dirty="0" smtClean="0"/>
+              <a:t>68%.</a:t>
+            </a:r>
+            <a:endParaRPr lang="en-IN" dirty="0" smtClean="0"/>
           </a:p>
           <a:p>
             <a:r>
@@ -13677,10 +13604,93 @@
               <a:rPr lang="en-IN" dirty="0" smtClean="0"/>
               <a:t>Overall model is ok.</a:t>
             </a:r>
-            <a:endParaRPr lang="en-IN" dirty="0" smtClean="0"/>
           </a:p>
         </p:txBody>
       </p:sp>
+      <p:pic>
+        <p:nvPicPr>
+          <p:cNvPr id="5" name="Picture 4"/>
+          <p:cNvPicPr>
+            <a:picLocks noChangeAspect="1"/>
+          </p:cNvPicPr>
+          <p:nvPr/>
+        </p:nvPicPr>
+        <p:blipFill>
+          <a:blip r:embed="rId2"/>
+          <a:stretch>
+            <a:fillRect/>
+          </a:stretch>
+        </p:blipFill>
+        <p:spPr>
+          <a:xfrm>
+            <a:off x="671458" y="859866"/>
+            <a:ext cx="4404742" cy="3398815"/>
+          </a:xfrm>
+          <a:prstGeom prst="rect">
+            <a:avLst/>
+          </a:prstGeom>
+        </p:spPr>
+      </p:pic>
+      <p:pic>
+        <p:nvPicPr>
+          <p:cNvPr id="7" name="Picture 6"/>
+          <p:cNvPicPr>
+            <a:picLocks noChangeAspect="1"/>
+          </p:cNvPicPr>
+          <p:nvPr/>
+        </p:nvPicPr>
+        <p:blipFill>
+          <a:blip r:embed="rId3">
+            <a:extLst>
+              <a:ext uri="{28A0092B-C50C-407E-A947-70E740481C1C}">
+                <a14:useLocalDpi xmlns:a14="http://schemas.microsoft.com/office/drawing/2010/main" val="0"/>
+              </a:ext>
+            </a:extLst>
+          </a:blip>
+          <a:stretch>
+            <a:fillRect/>
+          </a:stretch>
+        </p:blipFill>
+        <p:spPr>
+          <a:xfrm>
+            <a:off x="5763758" y="2862065"/>
+            <a:ext cx="5212090" cy="3995936"/>
+          </a:xfrm>
+          <a:prstGeom prst="rect">
+            <a:avLst/>
+          </a:prstGeom>
+        </p:spPr>
+      </p:pic>
+      <p:pic>
+        <p:nvPicPr>
+          <p:cNvPr id="8" name="Picture 7"/>
+          <p:cNvPicPr>
+            <a:picLocks noChangeAspect="1"/>
+          </p:cNvPicPr>
+          <p:nvPr/>
+        </p:nvPicPr>
+        <p:blipFill>
+          <a:blip r:embed="rId4">
+            <a:extLst>
+              <a:ext uri="{28A0092B-C50C-407E-A947-70E740481C1C}">
+                <a14:useLocalDpi xmlns:a14="http://schemas.microsoft.com/office/drawing/2010/main" val="0"/>
+              </a:ext>
+            </a:extLst>
+          </a:blip>
+          <a:stretch>
+            <a:fillRect/>
+          </a:stretch>
+        </p:blipFill>
+        <p:spPr>
+          <a:xfrm>
+            <a:off x="555131" y="3968905"/>
+            <a:ext cx="4757098" cy="2889096"/>
+          </a:xfrm>
+          <a:prstGeom prst="rect">
+            <a:avLst/>
+          </a:prstGeom>
+        </p:spPr>
+      </p:pic>
     </p:spTree>
     <p:extLst>
       <p:ext uri="{BB962C8B-B14F-4D97-AF65-F5344CB8AC3E}">
@@ -13725,7 +13735,7 @@
                                           </p:stCondLst>
                                         </p:cTn>
                                         <p:tgtEl>
-                                          <p:spTgt spid="3"/>
+                                          <p:spTgt spid="5"/>
                                         </p:tgtEl>
                                         <p:attrNameLst>
                                           <p:attrName>style.visibility</p:attrName>
@@ -13739,7 +13749,7 @@
                                       <p:cBhvr additive="base">
                                         <p:cTn id="7" dur="500" fill="hold"/>
                                         <p:tgtEl>
-                                          <p:spTgt spid="3"/>
+                                          <p:spTgt spid="5"/>
                                         </p:tgtEl>
                                         <p:attrNameLst>
                                           <p:attrName>ppt_x</p:attrName>
@@ -13762,7 +13772,7 @@
                                       <p:cBhvr additive="base">
                                         <p:cTn id="8" dur="500" fill="hold"/>
                                         <p:tgtEl>
-                                          <p:spTgt spid="3"/>
+                                          <p:spTgt spid="5"/>
                                         </p:tgtEl>
                                         <p:attrNameLst>
                                           <p:attrName>ppt_y</p:attrName>
@@ -13816,7 +13826,7 @@
                                           </p:stCondLst>
                                         </p:cTn>
                                         <p:tgtEl>
-                                          <p:spTgt spid="4"/>
+                                          <p:spTgt spid="8"/>
                                         </p:tgtEl>
                                         <p:attrNameLst>
                                           <p:attrName>style.visibility</p:attrName>
@@ -13830,7 +13840,7 @@
                                       <p:cBhvr additive="base">
                                         <p:cTn id="13" dur="500" fill="hold"/>
                                         <p:tgtEl>
-                                          <p:spTgt spid="4"/>
+                                          <p:spTgt spid="8"/>
                                         </p:tgtEl>
                                         <p:attrNameLst>
                                           <p:attrName>ppt_x</p:attrName>
@@ -13853,7 +13863,7 @@
                                       <p:cBhvr additive="base">
                                         <p:cTn id="14" dur="500" fill="hold"/>
                                         <p:tgtEl>
-                                          <p:spTgt spid="4"/>
+                                          <p:spTgt spid="8"/>
                                         </p:tgtEl>
                                         <p:attrNameLst>
                                           <p:attrName>ppt_y</p:attrName>
@@ -13907,7 +13917,7 @@
                                           </p:stCondLst>
                                         </p:cTn>
                                         <p:tgtEl>
-                                          <p:spTgt spid="6"/>
+                                          <p:spTgt spid="7"/>
                                         </p:tgtEl>
                                         <p:attrNameLst>
                                           <p:attrName>style.visibility</p:attrName>
@@ -13921,7 +13931,7 @@
                                       <p:cBhvr additive="base">
                                         <p:cTn id="19" dur="500" fill="hold"/>
                                         <p:tgtEl>
-                                          <p:spTgt spid="6"/>
+                                          <p:spTgt spid="7"/>
                                         </p:tgtEl>
                                         <p:attrNameLst>
                                           <p:attrName>ppt_x</p:attrName>
@@ -13944,7 +13954,7 @@
                                       <p:cBhvr additive="base">
                                         <p:cTn id="20" dur="500" fill="hold"/>
                                         <p:tgtEl>
-                                          <p:spTgt spid="6"/>
+                                          <p:spTgt spid="7"/>
                                         </p:tgtEl>
                                         <p:attrNameLst>
                                           <p:attrName>ppt_y</p:attrName>
@@ -14560,90 +14570,6 @@
           </a:p>
         </p:txBody>
       </p:sp>
-      <p:pic>
-        <p:nvPicPr>
-          <p:cNvPr id="5" name="Picture 4"/>
-          <p:cNvPicPr>
-            <a:picLocks noChangeAspect="1"/>
-          </p:cNvPicPr>
-          <p:nvPr/>
-        </p:nvPicPr>
-        <p:blipFill>
-          <a:blip r:embed="rId2"/>
-          <a:stretch>
-            <a:fillRect/>
-          </a:stretch>
-        </p:blipFill>
-        <p:spPr>
-          <a:xfrm>
-            <a:off x="598179" y="825282"/>
-            <a:ext cx="4359018" cy="3109229"/>
-          </a:xfrm>
-          <a:prstGeom prst="rect">
-            <a:avLst/>
-          </a:prstGeom>
-        </p:spPr>
-      </p:pic>
-      <p:pic>
-        <p:nvPicPr>
-          <p:cNvPr id="7" name="Picture 6"/>
-          <p:cNvPicPr>
-            <a:picLocks noChangeAspect="1"/>
-          </p:cNvPicPr>
-          <p:nvPr/>
-        </p:nvPicPr>
-        <p:blipFill>
-          <a:blip r:embed="rId3">
-            <a:extLst>
-              <a:ext uri="{28A0092B-C50C-407E-A947-70E740481C1C}">
-                <a14:useLocalDpi xmlns:a14="http://schemas.microsoft.com/office/drawing/2010/main" val="0"/>
-              </a:ext>
-            </a:extLst>
-          </a:blip>
-          <a:stretch>
-            <a:fillRect/>
-          </a:stretch>
-        </p:blipFill>
-        <p:spPr>
-          <a:xfrm>
-            <a:off x="598179" y="3934511"/>
-            <a:ext cx="4787637" cy="2907644"/>
-          </a:xfrm>
-          <a:prstGeom prst="rect">
-            <a:avLst/>
-          </a:prstGeom>
-        </p:spPr>
-      </p:pic>
-      <p:pic>
-        <p:nvPicPr>
-          <p:cNvPr id="8" name="Picture 7"/>
-          <p:cNvPicPr>
-            <a:picLocks noChangeAspect="1"/>
-          </p:cNvPicPr>
-          <p:nvPr/>
-        </p:nvPicPr>
-        <p:blipFill>
-          <a:blip r:embed="rId4">
-            <a:extLst>
-              <a:ext uri="{28A0092B-C50C-407E-A947-70E740481C1C}">
-                <a14:useLocalDpi xmlns:a14="http://schemas.microsoft.com/office/drawing/2010/main" val="0"/>
-              </a:ext>
-            </a:extLst>
-          </a:blip>
-          <a:stretch>
-            <a:fillRect/>
-          </a:stretch>
-        </p:blipFill>
-        <p:spPr>
-          <a:xfrm>
-            <a:off x="6160003" y="2862064"/>
-            <a:ext cx="5212090" cy="3995936"/>
-          </a:xfrm>
-          <a:prstGeom prst="rect">
-            <a:avLst/>
-          </a:prstGeom>
-        </p:spPr>
-      </p:pic>
       <p:sp>
         <p:nvSpPr>
           <p:cNvPr id="9" name="Content Placeholder 2"/>
@@ -14895,7 +14821,15 @@
           <a:p>
             <a:r>
               <a:rPr lang="en-IN" dirty="0" smtClean="0"/>
-              <a:t>We are getting 79.5% train accuracy and 74% Test accuracy.</a:t>
+              <a:t>We are getting 79.5% train accuracy and </a:t>
+            </a:r>
+            <a:r>
+              <a:rPr lang="en-IN" dirty="0" smtClean="0"/>
+              <a:t>73.8% </a:t>
+            </a:r>
+            <a:r>
+              <a:rPr lang="en-IN" dirty="0" smtClean="0"/>
+              <a:t>Test accuracy.</a:t>
             </a:r>
           </a:p>
           <a:p>
@@ -14921,10 +14855,93 @@
               <a:rPr lang="en-IN" dirty="0" smtClean="0"/>
               <a:t>Overall model is good.</a:t>
             </a:r>
-            <a:endParaRPr lang="en-IN" dirty="0" smtClean="0"/>
           </a:p>
         </p:txBody>
       </p:sp>
+      <p:pic>
+        <p:nvPicPr>
+          <p:cNvPr id="3" name="Picture 2"/>
+          <p:cNvPicPr>
+            <a:picLocks noChangeAspect="1"/>
+          </p:cNvPicPr>
+          <p:nvPr/>
+        </p:nvPicPr>
+        <p:blipFill>
+          <a:blip r:embed="rId2"/>
+          <a:stretch>
+            <a:fillRect/>
+          </a:stretch>
+        </p:blipFill>
+        <p:spPr>
+          <a:xfrm>
+            <a:off x="751523" y="760787"/>
+            <a:ext cx="4480948" cy="3086367"/>
+          </a:xfrm>
+          <a:prstGeom prst="rect">
+            <a:avLst/>
+          </a:prstGeom>
+        </p:spPr>
+      </p:pic>
+      <p:pic>
+        <p:nvPicPr>
+          <p:cNvPr id="4" name="Picture 3"/>
+          <p:cNvPicPr>
+            <a:picLocks noChangeAspect="1"/>
+          </p:cNvPicPr>
+          <p:nvPr/>
+        </p:nvPicPr>
+        <p:blipFill>
+          <a:blip r:embed="rId3">
+            <a:extLst>
+              <a:ext uri="{28A0092B-C50C-407E-A947-70E740481C1C}">
+                <a14:useLocalDpi xmlns:a14="http://schemas.microsoft.com/office/drawing/2010/main" val="0"/>
+              </a:ext>
+            </a:extLst>
+          </a:blip>
+          <a:stretch>
+            <a:fillRect/>
+          </a:stretch>
+        </p:blipFill>
+        <p:spPr>
+          <a:xfrm>
+            <a:off x="6421571" y="2862064"/>
+            <a:ext cx="5212090" cy="3995936"/>
+          </a:xfrm>
+          <a:prstGeom prst="rect">
+            <a:avLst/>
+          </a:prstGeom>
+        </p:spPr>
+      </p:pic>
+      <p:pic>
+        <p:nvPicPr>
+          <p:cNvPr id="6" name="Picture 5"/>
+          <p:cNvPicPr>
+            <a:picLocks noChangeAspect="1"/>
+          </p:cNvPicPr>
+          <p:nvPr/>
+        </p:nvPicPr>
+        <p:blipFill>
+          <a:blip r:embed="rId4">
+            <a:extLst>
+              <a:ext uri="{28A0092B-C50C-407E-A947-70E740481C1C}">
+                <a14:useLocalDpi xmlns:a14="http://schemas.microsoft.com/office/drawing/2010/main" val="0"/>
+              </a:ext>
+            </a:extLst>
+          </a:blip>
+          <a:stretch>
+            <a:fillRect/>
+          </a:stretch>
+        </p:blipFill>
+        <p:spPr>
+          <a:xfrm>
+            <a:off x="598179" y="3710991"/>
+            <a:ext cx="5072983" cy="3080941"/>
+          </a:xfrm>
+          <a:prstGeom prst="rect">
+            <a:avLst/>
+          </a:prstGeom>
+        </p:spPr>
+      </p:pic>
     </p:spTree>
     <p:extLst>
       <p:ext uri="{BB962C8B-B14F-4D97-AF65-F5344CB8AC3E}">
@@ -14969,7 +14986,7 @@
                                           </p:stCondLst>
                                         </p:cTn>
                                         <p:tgtEl>
-                                          <p:spTgt spid="5"/>
+                                          <p:spTgt spid="3"/>
                                         </p:tgtEl>
                                         <p:attrNameLst>
                                           <p:attrName>style.visibility</p:attrName>
@@ -14983,7 +15000,7 @@
                                       <p:cBhvr additive="base">
                                         <p:cTn id="7" dur="500" fill="hold"/>
                                         <p:tgtEl>
-                                          <p:spTgt spid="5"/>
+                                          <p:spTgt spid="3"/>
                                         </p:tgtEl>
                                         <p:attrNameLst>
                                           <p:attrName>ppt_x</p:attrName>
@@ -15006,7 +15023,7 @@
                                       <p:cBhvr additive="base">
                                         <p:cTn id="8" dur="500" fill="hold"/>
                                         <p:tgtEl>
-                                          <p:spTgt spid="5"/>
+                                          <p:spTgt spid="3"/>
                                         </p:tgtEl>
                                         <p:attrNameLst>
                                           <p:attrName>ppt_y</p:attrName>
@@ -15060,7 +15077,7 @@
                                           </p:stCondLst>
                                         </p:cTn>
                                         <p:tgtEl>
-                                          <p:spTgt spid="7"/>
+                                          <p:spTgt spid="6"/>
                                         </p:tgtEl>
                                         <p:attrNameLst>
                                           <p:attrName>style.visibility</p:attrName>
@@ -15074,7 +15091,7 @@
                                       <p:cBhvr additive="base">
                                         <p:cTn id="13" dur="500" fill="hold"/>
                                         <p:tgtEl>
-                                          <p:spTgt spid="7"/>
+                                          <p:spTgt spid="6"/>
                                         </p:tgtEl>
                                         <p:attrNameLst>
                                           <p:attrName>ppt_x</p:attrName>
@@ -15097,7 +15114,7 @@
                                       <p:cBhvr additive="base">
                                         <p:cTn id="14" dur="500" fill="hold"/>
                                         <p:tgtEl>
-                                          <p:spTgt spid="7"/>
+                                          <p:spTgt spid="6"/>
                                         </p:tgtEl>
                                         <p:attrNameLst>
                                           <p:attrName>ppt_y</p:attrName>
@@ -15151,7 +15168,7 @@
                                           </p:stCondLst>
                                         </p:cTn>
                                         <p:tgtEl>
-                                          <p:spTgt spid="8"/>
+                                          <p:spTgt spid="4"/>
                                         </p:tgtEl>
                                         <p:attrNameLst>
                                           <p:attrName>style.visibility</p:attrName>
@@ -15165,7 +15182,7 @@
                                       <p:cBhvr additive="base">
                                         <p:cTn id="19" dur="500" fill="hold"/>
                                         <p:tgtEl>
-                                          <p:spTgt spid="8"/>
+                                          <p:spTgt spid="4"/>
                                         </p:tgtEl>
                                         <p:attrNameLst>
                                           <p:attrName>ppt_x</p:attrName>
@@ -15188,7 +15205,7 @@
                                       <p:cBhvr additive="base">
                                         <p:cTn id="20" dur="500" fill="hold"/>
                                         <p:tgtEl>
-                                          <p:spTgt spid="8"/>
+                                          <p:spTgt spid="4"/>
                                         </p:tgtEl>
                                         <p:attrNameLst>
                                           <p:attrName>ppt_y</p:attrName>
@@ -15923,7 +15940,7 @@
                             </p:stCondLst>
                             <p:childTnLst>
                               <p:par>
-                                <p:cTn id="5" presetID="2" presetClass="entr" presetSubtype="4" fill="hold" grpId="0" nodeType="clickEffect">
+                                <p:cTn id="5" presetID="42" presetClass="entr" presetSubtype="0" fill="hold" nodeType="clickEffect">
                                   <p:stCondLst>
                                     <p:cond delay="0"/>
                                   </p:stCondLst>
@@ -15936,11 +15953,7 @@
                                           </p:stCondLst>
                                         </p:cTn>
                                         <p:tgtEl>
-                                          <p:spTgt spid="3">
-                                            <p:txEl>
-                                              <p:pRg st="0" end="0"/>
-                                            </p:txEl>
-                                          </p:spTgt>
+                                          <p:spTgt spid="5"/>
                                         </p:tgtEl>
                                         <p:attrNameLst>
                                           <p:attrName>style.visibility</p:attrName>
@@ -15950,15 +15963,19 @@
                                         <p:strVal val="visible"/>
                                       </p:to>
                                     </p:set>
+                                    <p:animEffect transition="in" filter="fade">
+                                      <p:cBhvr>
+                                        <p:cTn id="7" dur="1000"/>
+                                        <p:tgtEl>
+                                          <p:spTgt spid="5"/>
+                                        </p:tgtEl>
+                                      </p:cBhvr>
+                                    </p:animEffect>
                                     <p:anim calcmode="lin" valueType="num">
-                                      <p:cBhvr additive="base">
-                                        <p:cTn id="7" dur="500" fill="hold"/>
-                                        <p:tgtEl>
-                                          <p:spTgt spid="3">
-                                            <p:txEl>
-                                              <p:pRg st="0" end="0"/>
-                                            </p:txEl>
-                                          </p:spTgt>
+                                      <p:cBhvr>
+                                        <p:cTn id="8" dur="1000" fill="hold"/>
+                                        <p:tgtEl>
+                                          <p:spTgt spid="5"/>
                                         </p:tgtEl>
                                         <p:attrNameLst>
                                           <p:attrName>ppt_x</p:attrName>
@@ -15978,14 +15995,10 @@
                                       </p:tavLst>
                                     </p:anim>
                                     <p:anim calcmode="lin" valueType="num">
-                                      <p:cBhvr additive="base">
-                                        <p:cTn id="8" dur="500" fill="hold"/>
-                                        <p:tgtEl>
-                                          <p:spTgt spid="3">
-                                            <p:txEl>
-                                              <p:pRg st="0" end="0"/>
-                                            </p:txEl>
-                                          </p:spTgt>
+                                      <p:cBhvr>
+                                        <p:cTn id="9" dur="1000" fill="hold"/>
+                                        <p:tgtEl>
+                                          <p:spTgt spid="5"/>
                                         </p:tgtEl>
                                         <p:attrNameLst>
                                           <p:attrName>ppt_y</p:attrName>
@@ -15994,7 +16007,7 @@
                                       <p:tavLst>
                                         <p:tav tm="0">
                                           <p:val>
-                                            <p:strVal val="1+#ppt_h/2"/>
+                                            <p:strVal val="#ppt_y+.1"/>
                                           </p:val>
                                         </p:tav>
                                         <p:tav tm="100000">
@@ -16014,26 +16027,26 @@
                     </p:cTn>
                   </p:par>
                   <p:par>
-                    <p:cTn id="9" fill="hold">
+                    <p:cTn id="10" fill="hold">
                       <p:stCondLst>
                         <p:cond delay="indefinite"/>
                       </p:stCondLst>
                       <p:childTnLst>
                         <p:par>
-                          <p:cTn id="10" fill="hold">
+                          <p:cTn id="11" fill="hold">
                             <p:stCondLst>
                               <p:cond delay="0"/>
                             </p:stCondLst>
                             <p:childTnLst>
                               <p:par>
-                                <p:cTn id="11" presetID="2" presetClass="entr" presetSubtype="4" fill="hold" grpId="0" nodeType="clickEffect">
+                                <p:cTn id="12" presetID="2" presetClass="entr" presetSubtype="4" fill="hold" grpId="0" nodeType="clickEffect">
                                   <p:stCondLst>
                                     <p:cond delay="0"/>
                                   </p:stCondLst>
                                   <p:childTnLst>
                                     <p:set>
                                       <p:cBhvr>
-                                        <p:cTn id="12" dur="1" fill="hold">
+                                        <p:cTn id="13" dur="1" fill="hold">
                                           <p:stCondLst>
                                             <p:cond delay="0"/>
                                           </p:stCondLst>
@@ -16041,7 +16054,7 @@
                                         <p:tgtEl>
                                           <p:spTgt spid="3">
                                             <p:txEl>
-                                              <p:pRg st="1" end="1"/>
+                                              <p:pRg st="0" end="0"/>
                                             </p:txEl>
                                           </p:spTgt>
                                         </p:tgtEl>
@@ -16055,7 +16068,92 @@
                                     </p:set>
                                     <p:anim calcmode="lin" valueType="num">
                                       <p:cBhvr additive="base">
-                                        <p:cTn id="13" dur="500" fill="hold"/>
+                                        <p:cTn id="14" dur="500" fill="hold"/>
+                                        <p:tgtEl>
+                                          <p:spTgt spid="3">
+                                            <p:txEl>
+                                              <p:pRg st="0" end="0"/>
+                                            </p:txEl>
+                                          </p:spTgt>
+                                        </p:tgtEl>
+                                        <p:attrNameLst>
+                                          <p:attrName>ppt_x</p:attrName>
+                                        </p:attrNameLst>
+                                      </p:cBhvr>
+                                      <p:tavLst>
+                                        <p:tav tm="0">
+                                          <p:val>
+                                            <p:strVal val="#ppt_x"/>
+                                          </p:val>
+                                        </p:tav>
+                                        <p:tav tm="100000">
+                                          <p:val>
+                                            <p:strVal val="#ppt_x"/>
+                                          </p:val>
+                                        </p:tav>
+                                      </p:tavLst>
+                                    </p:anim>
+                                    <p:anim calcmode="lin" valueType="num">
+                                      <p:cBhvr additive="base">
+                                        <p:cTn id="15" dur="500" fill="hold"/>
+                                        <p:tgtEl>
+                                          <p:spTgt spid="3">
+                                            <p:txEl>
+                                              <p:pRg st="0" end="0"/>
+                                            </p:txEl>
+                                          </p:spTgt>
+                                        </p:tgtEl>
+                                        <p:attrNameLst>
+                                          <p:attrName>ppt_y</p:attrName>
+                                        </p:attrNameLst>
+                                      </p:cBhvr>
+                                      <p:tavLst>
+                                        <p:tav tm="0">
+                                          <p:val>
+                                            <p:strVal val="1+#ppt_h/2"/>
+                                          </p:val>
+                                        </p:tav>
+                                        <p:tav tm="100000">
+                                          <p:val>
+                                            <p:strVal val="#ppt_y"/>
+                                          </p:val>
+                                        </p:tav>
+                                      </p:tavLst>
+                                    </p:anim>
+                                  </p:childTnLst>
+                                </p:cTn>
+                              </p:par>
+                            </p:childTnLst>
+                          </p:cTn>
+                        </p:par>
+                      </p:childTnLst>
+                    </p:cTn>
+                  </p:par>
+                  <p:par>
+                    <p:cTn id="16" fill="hold">
+                      <p:stCondLst>
+                        <p:cond delay="indefinite"/>
+                      </p:stCondLst>
+                      <p:childTnLst>
+                        <p:par>
+                          <p:cTn id="17" fill="hold">
+                            <p:stCondLst>
+                              <p:cond delay="0"/>
+                            </p:stCondLst>
+                            <p:childTnLst>
+                              <p:par>
+                                <p:cTn id="18" presetID="2" presetClass="entr" presetSubtype="4" fill="hold" grpId="0" nodeType="clickEffect">
+                                  <p:stCondLst>
+                                    <p:cond delay="0"/>
+                                  </p:stCondLst>
+                                  <p:childTnLst>
+                                    <p:set>
+                                      <p:cBhvr>
+                                        <p:cTn id="19" dur="1" fill="hold">
+                                          <p:stCondLst>
+                                            <p:cond delay="0"/>
+                                          </p:stCondLst>
+                                        </p:cTn>
                                         <p:tgtEl>
                                           <p:spTgt spid="3">
                                             <p:txEl>
@@ -16064,6 +16162,24 @@
                                           </p:spTgt>
                                         </p:tgtEl>
                                         <p:attrNameLst>
+                                          <p:attrName>style.visibility</p:attrName>
+                                        </p:attrNameLst>
+                                      </p:cBhvr>
+                                      <p:to>
+                                        <p:strVal val="visible"/>
+                                      </p:to>
+                                    </p:set>
+                                    <p:anim calcmode="lin" valueType="num">
+                                      <p:cBhvr additive="base">
+                                        <p:cTn id="20" dur="500" fill="hold"/>
+                                        <p:tgtEl>
+                                          <p:spTgt spid="3">
+                                            <p:txEl>
+                                              <p:pRg st="1" end="1"/>
+                                            </p:txEl>
+                                          </p:spTgt>
+                                        </p:tgtEl>
+                                        <p:attrNameLst>
                                           <p:attrName>ppt_x</p:attrName>
                                         </p:attrNameLst>
                                       </p:cBhvr>
@@ -16082,7 +16198,7 @@
                                     </p:anim>
                                     <p:anim calcmode="lin" valueType="num">
                                       <p:cBhvr additive="base">
-                                        <p:cTn id="14" dur="500" fill="hold"/>
+                                        <p:cTn id="21" dur="500" fill="hold"/>
                                         <p:tgtEl>
                                           <p:spTgt spid="3">
                                             <p:txEl>
@@ -16440,20 +16556,38 @@
           <a:p>
             <a:r>
               <a:rPr lang="en-IN" dirty="0" smtClean="0"/>
-              <a:t>We are getting 99.2% train accuracy and 70.6% Test accuracy. Model is overfitting.</a:t>
+              <a:t>We are getting 99.2% train accuracy and </a:t>
+            </a:r>
+            <a:r>
+              <a:rPr lang="en-IN" dirty="0" smtClean="0"/>
+              <a:t>70.2% </a:t>
+            </a:r>
+            <a:r>
+              <a:rPr lang="en-IN" dirty="0" smtClean="0"/>
+              <a:t>Test accuracy. Model is overfitting.</a:t>
             </a:r>
           </a:p>
           <a:p>
             <a:r>
               <a:rPr lang="en-IN" dirty="0" smtClean="0"/>
-              <a:t>Precision and Recall is at 71%.</a:t>
+              <a:t>Precision and Recall is at </a:t>
             </a:r>
+            <a:r>
+              <a:rPr lang="en-IN" dirty="0" smtClean="0"/>
+              <a:t>70%.</a:t>
+            </a:r>
+            <a:endParaRPr lang="en-IN" dirty="0" smtClean="0"/>
           </a:p>
           <a:p>
             <a:r>
               <a:rPr lang="en-IN" dirty="0" smtClean="0"/>
-              <a:t>AUC is 71%.</a:t>
+              <a:t>AUC is </a:t>
             </a:r>
+            <a:r>
+              <a:rPr lang="en-IN" dirty="0" smtClean="0"/>
+              <a:t>70%.</a:t>
+            </a:r>
+            <a:endParaRPr lang="en-IN" dirty="0" smtClean="0"/>
           </a:p>
           <a:p>
             <a:r>
@@ -16466,13 +16600,12 @@
               <a:rPr lang="en-IN" dirty="0" smtClean="0"/>
               <a:t>Overall model is ok.</a:t>
             </a:r>
-            <a:endParaRPr lang="en-IN" dirty="0" smtClean="0"/>
           </a:p>
         </p:txBody>
       </p:sp>
       <p:pic>
         <p:nvPicPr>
-          <p:cNvPr id="3" name="Picture 2"/>
+          <p:cNvPr id="5" name="Picture 4"/>
           <p:cNvPicPr>
             <a:picLocks noChangeAspect="1"/>
           </p:cNvPicPr>
@@ -16486,8 +16619,8 @@
         </p:blipFill>
         <p:spPr>
           <a:xfrm>
-            <a:off x="598179" y="825282"/>
-            <a:ext cx="5235394" cy="3238781"/>
+            <a:off x="667847" y="686521"/>
+            <a:ext cx="5197290" cy="3139712"/>
           </a:xfrm>
           <a:prstGeom prst="rect">
             <a:avLst/>
@@ -16496,7 +16629,7 @@
       </p:pic>
       <p:pic>
         <p:nvPicPr>
-          <p:cNvPr id="4" name="Picture 3"/>
+          <p:cNvPr id="7" name="Picture 6"/>
           <p:cNvPicPr>
             <a:picLocks noChangeAspect="1"/>
           </p:cNvPicPr>
@@ -16516,8 +16649,8 @@
         </p:blipFill>
         <p:spPr>
           <a:xfrm>
-            <a:off x="667847" y="4064063"/>
-            <a:ext cx="4553942" cy="2793937"/>
+            <a:off x="6588802" y="2862064"/>
+            <a:ext cx="5212090" cy="3995936"/>
           </a:xfrm>
           <a:prstGeom prst="rect">
             <a:avLst/>
@@ -16526,7 +16659,7 @@
       </p:pic>
       <p:pic>
         <p:nvPicPr>
-          <p:cNvPr id="6" name="Picture 5"/>
+          <p:cNvPr id="8" name="Picture 7"/>
           <p:cNvPicPr>
             <a:picLocks noChangeAspect="1"/>
           </p:cNvPicPr>
@@ -16546,8 +16679,8 @@
         </p:blipFill>
         <p:spPr>
           <a:xfrm>
-            <a:off x="6334485" y="2862064"/>
-            <a:ext cx="5212090" cy="3995936"/>
+            <a:off x="808494" y="3744671"/>
+            <a:ext cx="5126311" cy="3113329"/>
           </a:xfrm>
           <a:prstGeom prst="rect">
             <a:avLst/>
@@ -16598,7 +16731,7 @@
                                           </p:stCondLst>
                                         </p:cTn>
                                         <p:tgtEl>
-                                          <p:spTgt spid="3"/>
+                                          <p:spTgt spid="5"/>
                                         </p:tgtEl>
                                         <p:attrNameLst>
                                           <p:attrName>style.visibility</p:attrName>
@@ -16612,7 +16745,7 @@
                                       <p:cBhvr additive="base">
                                         <p:cTn id="7" dur="500" fill="hold"/>
                                         <p:tgtEl>
-                                          <p:spTgt spid="3"/>
+                                          <p:spTgt spid="5"/>
                                         </p:tgtEl>
                                         <p:attrNameLst>
                                           <p:attrName>ppt_x</p:attrName>
@@ -16635,7 +16768,7 @@
                                       <p:cBhvr additive="base">
                                         <p:cTn id="8" dur="500" fill="hold"/>
                                         <p:tgtEl>
-                                          <p:spTgt spid="3"/>
+                                          <p:spTgt spid="5"/>
                                         </p:tgtEl>
                                         <p:attrNameLst>
                                           <p:attrName>ppt_y</p:attrName>
@@ -16689,7 +16822,7 @@
                                           </p:stCondLst>
                                         </p:cTn>
                                         <p:tgtEl>
-                                          <p:spTgt spid="4"/>
+                                          <p:spTgt spid="8"/>
                                         </p:tgtEl>
                                         <p:attrNameLst>
                                           <p:attrName>style.visibility</p:attrName>
@@ -16703,7 +16836,7 @@
                                       <p:cBhvr additive="base">
                                         <p:cTn id="13" dur="500" fill="hold"/>
                                         <p:tgtEl>
-                                          <p:spTgt spid="4"/>
+                                          <p:spTgt spid="8"/>
                                         </p:tgtEl>
                                         <p:attrNameLst>
                                           <p:attrName>ppt_x</p:attrName>
@@ -16726,7 +16859,7 @@
                                       <p:cBhvr additive="base">
                                         <p:cTn id="14" dur="500" fill="hold"/>
                                         <p:tgtEl>
-                                          <p:spTgt spid="4"/>
+                                          <p:spTgt spid="8"/>
                                         </p:tgtEl>
                                         <p:attrNameLst>
                                           <p:attrName>ppt_y</p:attrName>
@@ -16780,7 +16913,7 @@
                                           </p:stCondLst>
                                         </p:cTn>
                                         <p:tgtEl>
-                                          <p:spTgt spid="6"/>
+                                          <p:spTgt spid="7"/>
                                         </p:tgtEl>
                                         <p:attrNameLst>
                                           <p:attrName>style.visibility</p:attrName>
@@ -16794,7 +16927,7 @@
                                       <p:cBhvr additive="base">
                                         <p:cTn id="19" dur="500" fill="hold"/>
                                         <p:tgtEl>
-                                          <p:spTgt spid="6"/>
+                                          <p:spTgt spid="7"/>
                                         </p:tgtEl>
                                         <p:attrNameLst>
                                           <p:attrName>ppt_x</p:attrName>
@@ -16817,7 +16950,7 @@
                                       <p:cBhvr additive="base">
                                         <p:cTn id="20" dur="500" fill="hold"/>
                                         <p:tgtEl>
-                                          <p:spTgt spid="6"/>
+                                          <p:spTgt spid="7"/>
                                         </p:tgtEl>
                                         <p:attrNameLst>
                                           <p:attrName>ppt_y</p:attrName>
@@ -17684,14 +17817,27 @@
           <a:p>
             <a:r>
               <a:rPr lang="en-IN" dirty="0" smtClean="0"/>
-              <a:t>We are getting 99.2% train accuracy and 78.4% Test accuracy. Model is overfitting.</a:t>
+              <a:t>We are getting 99.2% train accuracy and </a:t>
+            </a:r>
+            <a:r>
+              <a:rPr lang="en-IN" dirty="0" smtClean="0"/>
+              <a:t>77% </a:t>
+            </a:r>
+            <a:r>
+              <a:rPr lang="en-IN" dirty="0" smtClean="0"/>
+              <a:t>Test accuracy. Model is overfitting.</a:t>
             </a:r>
           </a:p>
           <a:p>
             <a:r>
               <a:rPr lang="en-IN" dirty="0" smtClean="0"/>
-              <a:t>Precision and Recall is at 78%.</a:t>
+              <a:t>Precision and Recall is at </a:t>
             </a:r>
+            <a:r>
+              <a:rPr lang="en-IN" dirty="0" smtClean="0"/>
+              <a:t>77%.</a:t>
+            </a:r>
+            <a:endParaRPr lang="en-IN" dirty="0" smtClean="0"/>
           </a:p>
           <a:p>
             <a:r>
@@ -17710,28 +17856,26 @@
               <a:rPr lang="en-IN" dirty="0" smtClean="0"/>
               <a:t>Overall model is good.</a:t>
             </a:r>
-            <a:endParaRPr lang="en-IN" dirty="0" smtClean="0"/>
           </a:p>
         </p:txBody>
       </p:sp>
       <p:pic>
         <p:nvPicPr>
-          <p:cNvPr id="5" name="Picture 4"/>
+          <p:cNvPr id="3" name="Picture 2"/>
           <p:cNvPicPr>
             <a:picLocks noChangeAspect="1"/>
           </p:cNvPicPr>
           <p:nvPr/>
         </p:nvPicPr>
-        <p:blipFill>
+        <p:blipFill rotWithShape="1">
           <a:blip r:embed="rId2"/>
-          <a:stretch>
-            <a:fillRect/>
-          </a:stretch>
+          <a:srcRect r="22220"/>
+          <a:stretch/>
         </p:blipFill>
         <p:spPr>
           <a:xfrm>
-            <a:off x="588467" y="733834"/>
-            <a:ext cx="5189670" cy="3330229"/>
+            <a:off x="598179" y="665601"/>
+            <a:ext cx="5381997" cy="3025402"/>
           </a:xfrm>
           <a:prstGeom prst="rect">
             <a:avLst/>
@@ -17740,7 +17884,7 @@
       </p:pic>
       <p:pic>
         <p:nvPicPr>
-          <p:cNvPr id="7" name="Picture 6"/>
+          <p:cNvPr id="4" name="Picture 3"/>
           <p:cNvPicPr>
             <a:picLocks noChangeAspect="1"/>
           </p:cNvPicPr>
@@ -17760,8 +17904,8 @@
         </p:blipFill>
         <p:spPr>
           <a:xfrm>
-            <a:off x="6574848" y="2917377"/>
-            <a:ext cx="5139942" cy="3940623"/>
+            <a:off x="6574848" y="2862064"/>
+            <a:ext cx="5212090" cy="3995936"/>
           </a:xfrm>
           <a:prstGeom prst="rect">
             <a:avLst/>
@@ -17770,7 +17914,7 @@
       </p:pic>
       <p:pic>
         <p:nvPicPr>
-          <p:cNvPr id="8" name="Picture 7"/>
+          <p:cNvPr id="6" name="Picture 5"/>
           <p:cNvPicPr>
             <a:picLocks noChangeAspect="1"/>
           </p:cNvPicPr>
@@ -17790,8 +17934,8 @@
         </p:blipFill>
         <p:spPr>
           <a:xfrm>
-            <a:off x="598179" y="4044763"/>
-            <a:ext cx="4632189" cy="2813237"/>
+            <a:off x="345631" y="3691003"/>
+            <a:ext cx="5166895" cy="3137976"/>
           </a:xfrm>
           <a:prstGeom prst="rect">
             <a:avLst/>
@@ -17842,7 +17986,7 @@
                                           </p:stCondLst>
                                         </p:cTn>
                                         <p:tgtEl>
-                                          <p:spTgt spid="5"/>
+                                          <p:spTgt spid="3"/>
                                         </p:tgtEl>
                                         <p:attrNameLst>
                                           <p:attrName>style.visibility</p:attrName>
@@ -17856,7 +18000,7 @@
                                       <p:cBhvr additive="base">
                                         <p:cTn id="7" dur="500" fill="hold"/>
                                         <p:tgtEl>
-                                          <p:spTgt spid="5"/>
+                                          <p:spTgt spid="3"/>
                                         </p:tgtEl>
                                         <p:attrNameLst>
                                           <p:attrName>ppt_x</p:attrName>
@@ -17879,7 +18023,7 @@
                                       <p:cBhvr additive="base">
                                         <p:cTn id="8" dur="500" fill="hold"/>
                                         <p:tgtEl>
-                                          <p:spTgt spid="5"/>
+                                          <p:spTgt spid="3"/>
                                         </p:tgtEl>
                                         <p:attrNameLst>
                                           <p:attrName>ppt_y</p:attrName>
@@ -17933,7 +18077,7 @@
                                           </p:stCondLst>
                                         </p:cTn>
                                         <p:tgtEl>
-                                          <p:spTgt spid="8"/>
+                                          <p:spTgt spid="6"/>
                                         </p:tgtEl>
                                         <p:attrNameLst>
                                           <p:attrName>style.visibility</p:attrName>
@@ -17947,7 +18091,7 @@
                                       <p:cBhvr additive="base">
                                         <p:cTn id="13" dur="500" fill="hold"/>
                                         <p:tgtEl>
-                                          <p:spTgt spid="8"/>
+                                          <p:spTgt spid="6"/>
                                         </p:tgtEl>
                                         <p:attrNameLst>
                                           <p:attrName>ppt_x</p:attrName>
@@ -17970,7 +18114,7 @@
                                       <p:cBhvr additive="base">
                                         <p:cTn id="14" dur="500" fill="hold"/>
                                         <p:tgtEl>
-                                          <p:spTgt spid="8"/>
+                                          <p:spTgt spid="6"/>
                                         </p:tgtEl>
                                         <p:attrNameLst>
                                           <p:attrName>ppt_y</p:attrName>
@@ -18024,7 +18168,7 @@
                                           </p:stCondLst>
                                         </p:cTn>
                                         <p:tgtEl>
-                                          <p:spTgt spid="7"/>
+                                          <p:spTgt spid="4"/>
                                         </p:tgtEl>
                                         <p:attrNameLst>
                                           <p:attrName>style.visibility</p:attrName>
@@ -18038,7 +18182,7 @@
                                       <p:cBhvr additive="base">
                                         <p:cTn id="19" dur="500" fill="hold"/>
                                         <p:tgtEl>
-                                          <p:spTgt spid="7"/>
+                                          <p:spTgt spid="4"/>
                                         </p:tgtEl>
                                         <p:attrNameLst>
                                           <p:attrName>ppt_x</p:attrName>
@@ -18061,7 +18205,7 @@
                                       <p:cBhvr additive="base">
                                         <p:cTn id="20" dur="500" fill="hold"/>
                                         <p:tgtEl>
-                                          <p:spTgt spid="7"/>
+                                          <p:spTgt spid="4"/>
                                         </p:tgtEl>
                                         <p:attrNameLst>
                                           <p:attrName>ppt_y</p:attrName>
@@ -18928,14 +19072,27 @@
           <a:p>
             <a:r>
               <a:rPr lang="en-IN" dirty="0" smtClean="0"/>
-              <a:t>We are getting 67.5% train accuracy and 66.4% Test accuracy.</a:t>
+              <a:t>We are getting 67.5% train accuracy and </a:t>
+            </a:r>
+            <a:r>
+              <a:rPr lang="en-IN" dirty="0" smtClean="0"/>
+              <a:t>66.7% </a:t>
+            </a:r>
+            <a:r>
+              <a:rPr lang="en-IN" dirty="0" smtClean="0"/>
+              <a:t>Test accuracy.</a:t>
             </a:r>
           </a:p>
           <a:p>
             <a:r>
               <a:rPr lang="en-IN" dirty="0" smtClean="0"/>
-              <a:t>Precision and Recall is at 66%.</a:t>
+              <a:t>Precision and Recall is at </a:t>
             </a:r>
+            <a:r>
+              <a:rPr lang="en-IN" dirty="0" smtClean="0"/>
+              <a:t>67%.</a:t>
+            </a:r>
+            <a:endParaRPr lang="en-IN" dirty="0" smtClean="0"/>
           </a:p>
           <a:p>
             <a:r>
@@ -18954,13 +19111,12 @@
               <a:rPr lang="en-IN" dirty="0" smtClean="0"/>
               <a:t>Overall model is ok.</a:t>
             </a:r>
-            <a:endParaRPr lang="en-IN" dirty="0" smtClean="0"/>
           </a:p>
         </p:txBody>
       </p:sp>
       <p:pic>
         <p:nvPicPr>
-          <p:cNvPr id="3" name="Picture 2"/>
+          <p:cNvPr id="5" name="Picture 4"/>
           <p:cNvPicPr>
             <a:picLocks noChangeAspect="1"/>
           </p:cNvPicPr>
@@ -18974,8 +19130,8 @@
         </p:blipFill>
         <p:spPr>
           <a:xfrm>
-            <a:off x="598179" y="684580"/>
-            <a:ext cx="4854361" cy="3162574"/>
+            <a:off x="598179" y="665601"/>
+            <a:ext cx="4816257" cy="3139712"/>
           </a:xfrm>
           <a:prstGeom prst="rect">
             <a:avLst/>
@@ -18984,7 +19140,7 @@
       </p:pic>
       <p:pic>
         <p:nvPicPr>
-          <p:cNvPr id="4" name="Picture 3"/>
+          <p:cNvPr id="7" name="Picture 6"/>
           <p:cNvPicPr>
             <a:picLocks noChangeAspect="1"/>
           </p:cNvPicPr>
@@ -19004,8 +19160,8 @@
         </p:blipFill>
         <p:spPr>
           <a:xfrm>
-            <a:off x="139219" y="3712036"/>
-            <a:ext cx="5127725" cy="3145964"/>
+            <a:off x="6574848" y="2862063"/>
+            <a:ext cx="5212090" cy="3995936"/>
           </a:xfrm>
           <a:prstGeom prst="rect">
             <a:avLst/>
@@ -19014,7 +19170,7 @@
       </p:pic>
       <p:pic>
         <p:nvPicPr>
-          <p:cNvPr id="6" name="Picture 5"/>
+          <p:cNvPr id="8" name="Picture 7"/>
           <p:cNvPicPr>
             <a:picLocks noChangeAspect="1"/>
           </p:cNvPicPr>
@@ -19034,8 +19190,8 @@
         </p:blipFill>
         <p:spPr>
           <a:xfrm>
-            <a:off x="5911500" y="2862064"/>
-            <a:ext cx="5212090" cy="3995936"/>
+            <a:off x="455164" y="3760100"/>
+            <a:ext cx="5100906" cy="3097899"/>
           </a:xfrm>
           <a:prstGeom prst="rect">
             <a:avLst/>
@@ -19086,7 +19242,7 @@
                                           </p:stCondLst>
                                         </p:cTn>
                                         <p:tgtEl>
-                                          <p:spTgt spid="3"/>
+                                          <p:spTgt spid="5"/>
                                         </p:tgtEl>
                                         <p:attrNameLst>
                                           <p:attrName>style.visibility</p:attrName>
@@ -19100,7 +19256,7 @@
                                       <p:cBhvr additive="base">
                                         <p:cTn id="7" dur="500" fill="hold"/>
                                         <p:tgtEl>
-                                          <p:spTgt spid="3"/>
+                                          <p:spTgt spid="5"/>
                                         </p:tgtEl>
                                         <p:attrNameLst>
                                           <p:attrName>ppt_x</p:attrName>
@@ -19123,7 +19279,7 @@
                                       <p:cBhvr additive="base">
                                         <p:cTn id="8" dur="500" fill="hold"/>
                                         <p:tgtEl>
-                                          <p:spTgt spid="3"/>
+                                          <p:spTgt spid="5"/>
                                         </p:tgtEl>
                                         <p:attrNameLst>
                                           <p:attrName>ppt_y</p:attrName>
@@ -19177,7 +19333,7 @@
                                           </p:stCondLst>
                                         </p:cTn>
                                         <p:tgtEl>
-                                          <p:spTgt spid="4"/>
+                                          <p:spTgt spid="8"/>
                                         </p:tgtEl>
                                         <p:attrNameLst>
                                           <p:attrName>style.visibility</p:attrName>
@@ -19191,7 +19347,7 @@
                                       <p:cBhvr additive="base">
                                         <p:cTn id="13" dur="500" fill="hold"/>
                                         <p:tgtEl>
-                                          <p:spTgt spid="4"/>
+                                          <p:spTgt spid="8"/>
                                         </p:tgtEl>
                                         <p:attrNameLst>
                                           <p:attrName>ppt_x</p:attrName>
@@ -19214,7 +19370,7 @@
                                       <p:cBhvr additive="base">
                                         <p:cTn id="14" dur="500" fill="hold"/>
                                         <p:tgtEl>
-                                          <p:spTgt spid="4"/>
+                                          <p:spTgt spid="8"/>
                                         </p:tgtEl>
                                         <p:attrNameLst>
                                           <p:attrName>ppt_y</p:attrName>
@@ -19268,7 +19424,7 @@
                                           </p:stCondLst>
                                         </p:cTn>
                                         <p:tgtEl>
-                                          <p:spTgt spid="6"/>
+                                          <p:spTgt spid="7"/>
                                         </p:tgtEl>
                                         <p:attrNameLst>
                                           <p:attrName>style.visibility</p:attrName>
@@ -19282,7 +19438,7 @@
                                       <p:cBhvr additive="base">
                                         <p:cTn id="19" dur="500" fill="hold"/>
                                         <p:tgtEl>
-                                          <p:spTgt spid="6"/>
+                                          <p:spTgt spid="7"/>
                                         </p:tgtEl>
                                         <p:attrNameLst>
                                           <p:attrName>ppt_x</p:attrName>
@@ -19305,7 +19461,7 @@
                                       <p:cBhvr additive="base">
                                         <p:cTn id="20" dur="500" fill="hold"/>
                                         <p:tgtEl>
-                                          <p:spTgt spid="6"/>
+                                          <p:spTgt spid="7"/>
                                         </p:tgtEl>
                                         <p:attrNameLst>
                                           <p:attrName>ppt_y</p:attrName>
@@ -20172,7 +20328,23 @@
           <a:p>
             <a:r>
               <a:rPr lang="en-IN" dirty="0" smtClean="0"/>
-              <a:t>We are getting 73.8% train accuracy and 71.9% Test accuracy. </a:t>
+              <a:t>We are getting </a:t>
+            </a:r>
+            <a:r>
+              <a:rPr lang="en-IN" dirty="0" smtClean="0"/>
+              <a:t>73.7% </a:t>
+            </a:r>
+            <a:r>
+              <a:rPr lang="en-IN" dirty="0" smtClean="0"/>
+              <a:t>train accuracy and </a:t>
+            </a:r>
+            <a:r>
+              <a:rPr lang="en-IN" dirty="0" smtClean="0"/>
+              <a:t>71.6% </a:t>
+            </a:r>
+            <a:r>
+              <a:rPr lang="en-IN" dirty="0" smtClean="0"/>
+              <a:t>Test accuracy. </a:t>
             </a:r>
           </a:p>
           <a:p>
@@ -20198,13 +20370,12 @@
               <a:rPr lang="en-IN" dirty="0" smtClean="0"/>
               <a:t>Overall model is good.</a:t>
             </a:r>
-            <a:endParaRPr lang="en-IN" dirty="0" smtClean="0"/>
           </a:p>
         </p:txBody>
       </p:sp>
       <p:pic>
         <p:nvPicPr>
-          <p:cNvPr id="5" name="Picture 4"/>
+          <p:cNvPr id="3" name="Picture 2"/>
           <p:cNvPicPr>
             <a:picLocks noChangeAspect="1"/>
           </p:cNvPicPr>
@@ -20218,8 +20389,8 @@
         </p:blipFill>
         <p:spPr>
           <a:xfrm>
-            <a:off x="598179" y="746618"/>
-            <a:ext cx="5349704" cy="3261643"/>
+            <a:off x="598179" y="728434"/>
+            <a:ext cx="5646909" cy="3055885"/>
           </a:xfrm>
           <a:prstGeom prst="rect">
             <a:avLst/>
@@ -20228,7 +20399,7 @@
       </p:pic>
       <p:pic>
         <p:nvPicPr>
-          <p:cNvPr id="7" name="Picture 6"/>
+          <p:cNvPr id="4" name="Picture 3"/>
           <p:cNvPicPr>
             <a:picLocks noChangeAspect="1"/>
           </p:cNvPicPr>
@@ -20248,7 +20419,7 @@
         </p:blipFill>
         <p:spPr>
           <a:xfrm>
-            <a:off x="6224473" y="2862064"/>
+            <a:off x="6574848" y="2862064"/>
             <a:ext cx="5212090" cy="3995936"/>
           </a:xfrm>
           <a:prstGeom prst="rect">
@@ -20258,7 +20429,7 @@
       </p:pic>
       <p:pic>
         <p:nvPicPr>
-          <p:cNvPr id="8" name="Picture 7"/>
+          <p:cNvPr id="6" name="Picture 5"/>
           <p:cNvPicPr>
             <a:picLocks noChangeAspect="1"/>
           </p:cNvPicPr>
@@ -20278,8 +20449,8 @@
         </p:blipFill>
         <p:spPr>
           <a:xfrm>
-            <a:off x="321589" y="3947522"/>
-            <a:ext cx="4808195" cy="2920129"/>
+            <a:off x="794215" y="3784319"/>
+            <a:ext cx="4996985" cy="3034785"/>
           </a:xfrm>
           <a:prstGeom prst="rect">
             <a:avLst/>
@@ -20330,7 +20501,7 @@
                                           </p:stCondLst>
                                         </p:cTn>
                                         <p:tgtEl>
-                                          <p:spTgt spid="5"/>
+                                          <p:spTgt spid="3"/>
                                         </p:tgtEl>
                                         <p:attrNameLst>
                                           <p:attrName>style.visibility</p:attrName>
@@ -20344,7 +20515,7 @@
                                       <p:cBhvr additive="base">
                                         <p:cTn id="7" dur="500" fill="hold"/>
                                         <p:tgtEl>
-                                          <p:spTgt spid="5"/>
+                                          <p:spTgt spid="3"/>
                                         </p:tgtEl>
                                         <p:attrNameLst>
                                           <p:attrName>ppt_x</p:attrName>
@@ -20367,7 +20538,7 @@
                                       <p:cBhvr additive="base">
                                         <p:cTn id="8" dur="500" fill="hold"/>
                                         <p:tgtEl>
-                                          <p:spTgt spid="5"/>
+                                          <p:spTgt spid="3"/>
                                         </p:tgtEl>
                                         <p:attrNameLst>
                                           <p:attrName>ppt_y</p:attrName>
@@ -20421,7 +20592,7 @@
                                           </p:stCondLst>
                                         </p:cTn>
                                         <p:tgtEl>
-                                          <p:spTgt spid="8"/>
+                                          <p:spTgt spid="6"/>
                                         </p:tgtEl>
                                         <p:attrNameLst>
                                           <p:attrName>style.visibility</p:attrName>
@@ -20435,7 +20606,7 @@
                                       <p:cBhvr additive="base">
                                         <p:cTn id="13" dur="500" fill="hold"/>
                                         <p:tgtEl>
-                                          <p:spTgt spid="8"/>
+                                          <p:spTgt spid="6"/>
                                         </p:tgtEl>
                                         <p:attrNameLst>
                                           <p:attrName>ppt_x</p:attrName>
@@ -20458,7 +20629,7 @@
                                       <p:cBhvr additive="base">
                                         <p:cTn id="14" dur="500" fill="hold"/>
                                         <p:tgtEl>
-                                          <p:spTgt spid="8"/>
+                                          <p:spTgt spid="6"/>
                                         </p:tgtEl>
                                         <p:attrNameLst>
                                           <p:attrName>ppt_y</p:attrName>
@@ -20512,7 +20683,7 @@
                                           </p:stCondLst>
                                         </p:cTn>
                                         <p:tgtEl>
-                                          <p:spTgt spid="7"/>
+                                          <p:spTgt spid="4"/>
                                         </p:tgtEl>
                                         <p:attrNameLst>
                                           <p:attrName>style.visibility</p:attrName>
@@ -20526,7 +20697,7 @@
                                       <p:cBhvr additive="base">
                                         <p:cTn id="19" dur="500" fill="hold"/>
                                         <p:tgtEl>
-                                          <p:spTgt spid="7"/>
+                                          <p:spTgt spid="4"/>
                                         </p:tgtEl>
                                         <p:attrNameLst>
                                           <p:attrName>ppt_x</p:attrName>
@@ -20549,7 +20720,7 @@
                                       <p:cBhvr additive="base">
                                         <p:cTn id="20" dur="500" fill="hold"/>
                                         <p:tgtEl>
-                                          <p:spTgt spid="7"/>
+                                          <p:spTgt spid="4"/>
                                         </p:tgtEl>
                                         <p:attrNameLst>
                                           <p:attrName>ppt_y</p:attrName>
@@ -21179,8 +21350,8 @@
         </p:nvSpPr>
         <p:spPr>
           <a:xfrm>
-            <a:off x="6574848" y="665601"/>
-            <a:ext cx="4905537" cy="3181553"/>
+            <a:off x="6574849" y="665601"/>
+            <a:ext cx="4702752" cy="3181553"/>
           </a:xfrm>
           <a:prstGeom prst="rect">
             <a:avLst/>
@@ -21420,7 +21591,23 @@
           <a:p>
             <a:r>
               <a:rPr lang="en-IN" dirty="0" smtClean="0"/>
-              <a:t>We are getting 89.9% train accuracy and 77.3% Test accuracy.</a:t>
+              <a:t>We are getting </a:t>
+            </a:r>
+            <a:r>
+              <a:rPr lang="en-IN" dirty="0" smtClean="0"/>
+              <a:t>90.4% </a:t>
+            </a:r>
+            <a:r>
+              <a:rPr lang="en-IN" dirty="0" smtClean="0"/>
+              <a:t>train accuracy and </a:t>
+            </a:r>
+            <a:r>
+              <a:rPr lang="en-IN" dirty="0" smtClean="0"/>
+              <a:t>77% </a:t>
+            </a:r>
+            <a:r>
+              <a:rPr lang="en-IN" dirty="0" smtClean="0"/>
+              <a:t>Test accuracy.</a:t>
             </a:r>
           </a:p>
           <a:p>
@@ -21432,8 +21619,13 @@
           <a:p>
             <a:r>
               <a:rPr lang="en-IN" dirty="0" smtClean="0"/>
-              <a:t>AUC is 85%.</a:t>
+              <a:t>AUC is </a:t>
             </a:r>
+            <a:r>
+              <a:rPr lang="en-IN" dirty="0" smtClean="0"/>
+              <a:t>86%.</a:t>
+            </a:r>
+            <a:endParaRPr lang="en-IN" dirty="0" smtClean="0"/>
           </a:p>
           <a:p>
             <a:r>
@@ -21446,13 +21638,12 @@
               <a:rPr lang="en-IN" dirty="0" smtClean="0"/>
               <a:t>Overall model is good.</a:t>
             </a:r>
-            <a:endParaRPr lang="en-IN" dirty="0" smtClean="0"/>
           </a:p>
         </p:txBody>
       </p:sp>
       <p:pic>
         <p:nvPicPr>
-          <p:cNvPr id="3" name="Picture 2"/>
+          <p:cNvPr id="5" name="Picture 4"/>
           <p:cNvPicPr>
             <a:picLocks noChangeAspect="1"/>
           </p:cNvPicPr>
@@ -21466,8 +21657,8 @@
         </p:blipFill>
         <p:spPr>
           <a:xfrm>
-            <a:off x="598179" y="701810"/>
-            <a:ext cx="4714485" cy="3231112"/>
+            <a:off x="598179" y="745545"/>
+            <a:ext cx="4930567" cy="3101609"/>
           </a:xfrm>
           <a:prstGeom prst="rect">
             <a:avLst/>
@@ -21476,7 +21667,7 @@
       </p:pic>
       <p:pic>
         <p:nvPicPr>
-          <p:cNvPr id="4" name="Picture 3"/>
+          <p:cNvPr id="7" name="Picture 6"/>
           <p:cNvPicPr>
             <a:picLocks noChangeAspect="1"/>
           </p:cNvPicPr>
@@ -21496,7 +21687,7 @@
         </p:blipFill>
         <p:spPr>
           <a:xfrm>
-            <a:off x="6333739" y="2862064"/>
+            <a:off x="6320180" y="2860044"/>
             <a:ext cx="5212090" cy="3995936"/>
           </a:xfrm>
           <a:prstGeom prst="rect">
@@ -21506,7 +21697,7 @@
       </p:pic>
       <p:pic>
         <p:nvPicPr>
-          <p:cNvPr id="6" name="Picture 5"/>
+          <p:cNvPr id="8" name="Picture 7"/>
           <p:cNvPicPr>
             <a:picLocks noChangeAspect="1"/>
           </p:cNvPicPr>
@@ -21526,8 +21717,8 @@
         </p:blipFill>
         <p:spPr>
           <a:xfrm>
-            <a:off x="395753" y="3816312"/>
-            <a:ext cx="5008351" cy="3041688"/>
+            <a:off x="596281" y="3860379"/>
+            <a:ext cx="4932465" cy="2995601"/>
           </a:xfrm>
           <a:prstGeom prst="rect">
             <a:avLst/>
@@ -21578,7 +21769,7 @@
                                           </p:stCondLst>
                                         </p:cTn>
                                         <p:tgtEl>
-                                          <p:spTgt spid="3"/>
+                                          <p:spTgt spid="5"/>
                                         </p:tgtEl>
                                         <p:attrNameLst>
                                           <p:attrName>style.visibility</p:attrName>
@@ -21592,7 +21783,7 @@
                                       <p:cBhvr additive="base">
                                         <p:cTn id="7" dur="500" fill="hold"/>
                                         <p:tgtEl>
-                                          <p:spTgt spid="3"/>
+                                          <p:spTgt spid="5"/>
                                         </p:tgtEl>
                                         <p:attrNameLst>
                                           <p:attrName>ppt_x</p:attrName>
@@ -21615,7 +21806,7 @@
                                       <p:cBhvr additive="base">
                                         <p:cTn id="8" dur="500" fill="hold"/>
                                         <p:tgtEl>
-                                          <p:spTgt spid="3"/>
+                                          <p:spTgt spid="5"/>
                                         </p:tgtEl>
                                         <p:attrNameLst>
                                           <p:attrName>ppt_y</p:attrName>
@@ -21669,7 +21860,7 @@
                                           </p:stCondLst>
                                         </p:cTn>
                                         <p:tgtEl>
-                                          <p:spTgt spid="6"/>
+                                          <p:spTgt spid="8"/>
                                         </p:tgtEl>
                                         <p:attrNameLst>
                                           <p:attrName>style.visibility</p:attrName>
@@ -21683,7 +21874,7 @@
                                       <p:cBhvr additive="base">
                                         <p:cTn id="13" dur="500" fill="hold"/>
                                         <p:tgtEl>
-                                          <p:spTgt spid="6"/>
+                                          <p:spTgt spid="8"/>
                                         </p:tgtEl>
                                         <p:attrNameLst>
                                           <p:attrName>ppt_x</p:attrName>
@@ -21706,7 +21897,7 @@
                                       <p:cBhvr additive="base">
                                         <p:cTn id="14" dur="500" fill="hold"/>
                                         <p:tgtEl>
-                                          <p:spTgt spid="6"/>
+                                          <p:spTgt spid="8"/>
                                         </p:tgtEl>
                                         <p:attrNameLst>
                                           <p:attrName>ppt_y</p:attrName>
@@ -21760,7 +21951,7 @@
                                           </p:stCondLst>
                                         </p:cTn>
                                         <p:tgtEl>
-                                          <p:spTgt spid="4"/>
+                                          <p:spTgt spid="7"/>
                                         </p:tgtEl>
                                         <p:attrNameLst>
                                           <p:attrName>style.visibility</p:attrName>
@@ -21774,7 +21965,7 @@
                                       <p:cBhvr additive="base">
                                         <p:cTn id="19" dur="500" fill="hold"/>
                                         <p:tgtEl>
-                                          <p:spTgt spid="4"/>
+                                          <p:spTgt spid="7"/>
                                         </p:tgtEl>
                                         <p:attrNameLst>
                                           <p:attrName>ppt_x</p:attrName>
@@ -21797,7 +21988,7 @@
                                       <p:cBhvr additive="base">
                                         <p:cTn id="20" dur="500" fill="hold"/>
                                         <p:tgtEl>
-                                          <p:spTgt spid="4"/>
+                                          <p:spTgt spid="7"/>
                                         </p:tgtEl>
                                         <p:attrNameLst>
                                           <p:attrName>ppt_y</p:attrName>
@@ -22385,6 +22576,30 @@
           <a:chExt cx="0" cy="0"/>
         </a:xfrm>
       </p:grpSpPr>
+      <p:pic>
+        <p:nvPicPr>
+          <p:cNvPr id="4" name="Picture 3"/>
+          <p:cNvPicPr>
+            <a:picLocks noChangeAspect="1"/>
+          </p:cNvPicPr>
+          <p:nvPr/>
+        </p:nvPicPr>
+        <p:blipFill>
+          <a:blip r:embed="rId2"/>
+          <a:stretch>
+            <a:fillRect/>
+          </a:stretch>
+        </p:blipFill>
+        <p:spPr>
+          <a:xfrm>
+            <a:off x="677334" y="898163"/>
+            <a:ext cx="9122245" cy="2247373"/>
+          </a:xfrm>
+          <a:prstGeom prst="rect">
+            <a:avLst/>
+          </a:prstGeom>
+        </p:spPr>
+      </p:pic>
       <p:sp>
         <p:nvSpPr>
           <p:cNvPr id="2" name="Title 1"/>
@@ -22425,13 +22640,13 @@
         </p:nvSpPr>
         <p:spPr>
           <a:xfrm>
-            <a:off x="677334" y="4288536"/>
+            <a:off x="677334" y="4279392"/>
             <a:ext cx="8777562" cy="1964600"/>
           </a:xfrm>
         </p:spPr>
         <p:txBody>
           <a:bodyPr>
-            <a:normAutofit lnSpcReduction="10000"/>
+            <a:normAutofit/>
           </a:bodyPr>
           <a:lstStyle/>
           <a:p>
@@ -22468,64 +22683,18 @@
               <a:t> and Cross Validation to improve the models.</a:t>
             </a:r>
           </a:p>
-          <a:p>
-            <a:r>
-              <a:rPr lang="en-IN" dirty="0" smtClean="0"/>
-              <a:t>By using Hyper Parameter Tuning </a:t>
-            </a:r>
-            <a:r>
-              <a:rPr lang="en-IN" dirty="0" err="1" smtClean="0"/>
-              <a:t>XGBoost</a:t>
-            </a:r>
-            <a:r>
-              <a:rPr lang="en-IN" dirty="0" smtClean="0"/>
-              <a:t> was performing better than Random Forest. So created Final Model using </a:t>
-            </a:r>
-            <a:r>
-              <a:rPr lang="en-IN" dirty="0" err="1" smtClean="0"/>
-              <a:t>XGBoost</a:t>
-            </a:r>
-            <a:r>
-              <a:rPr lang="en-IN" dirty="0" smtClean="0"/>
-              <a:t> Classifier.</a:t>
-            </a:r>
-            <a:endParaRPr lang="de-DE" dirty="0"/>
-          </a:p>
         </p:txBody>
       </p:sp>
-      <p:pic>
-        <p:nvPicPr>
-          <p:cNvPr id="7" name="Picture 6"/>
-          <p:cNvPicPr>
-            <a:picLocks noChangeAspect="1"/>
-          </p:cNvPicPr>
-          <p:nvPr/>
-        </p:nvPicPr>
-        <p:blipFill rotWithShape="1">
-          <a:blip r:embed="rId2"/>
-          <a:srcRect l="2985" t="20104" r="6540" b="8093"/>
-          <a:stretch/>
-        </p:blipFill>
-        <p:spPr>
-          <a:xfrm>
-            <a:off x="0" y="1033272"/>
-            <a:ext cx="12176395" cy="2798064"/>
-          </a:xfrm>
-          <a:prstGeom prst="rect">
-            <a:avLst/>
-          </a:prstGeom>
-        </p:spPr>
-      </p:pic>
       <p:sp>
         <p:nvSpPr>
-          <p:cNvPr id="8" name="Rectangle 7"/>
+          <p:cNvPr id="9" name="Rectangle 8"/>
           <p:cNvSpPr/>
           <p:nvPr/>
         </p:nvSpPr>
         <p:spPr>
           <a:xfrm>
-            <a:off x="0" y="3511296"/>
-            <a:ext cx="6400800" cy="320040"/>
+            <a:off x="741342" y="2141728"/>
+            <a:ext cx="4668858" cy="256032"/>
           </a:xfrm>
           <a:prstGeom prst="rect">
             <a:avLst/>
@@ -22564,14 +22733,14 @@
       </p:sp>
       <p:sp>
         <p:nvSpPr>
-          <p:cNvPr id="9" name="Rectangle 8"/>
+          <p:cNvPr id="10" name="Rectangle 9"/>
           <p:cNvSpPr/>
           <p:nvPr/>
         </p:nvSpPr>
         <p:spPr>
           <a:xfrm>
-            <a:off x="0" y="2587752"/>
-            <a:ext cx="6400800" cy="338328"/>
+            <a:off x="741342" y="2816352"/>
+            <a:ext cx="4668858" cy="256032"/>
           </a:xfrm>
           <a:prstGeom prst="rect">
             <a:avLst/>
@@ -22652,7 +22821,7 @@
                                           </p:stCondLst>
                                         </p:cTn>
                                         <p:tgtEl>
-                                          <p:spTgt spid="7"/>
+                                          <p:spTgt spid="4"/>
                                         </p:tgtEl>
                                         <p:attrNameLst>
                                           <p:attrName>style.visibility</p:attrName>
@@ -22666,7 +22835,7 @@
                                       <p:cBhvr additive="base">
                                         <p:cTn id="7" dur="500" fill="hold"/>
                                         <p:tgtEl>
-                                          <p:spTgt spid="7"/>
+                                          <p:spTgt spid="4"/>
                                         </p:tgtEl>
                                         <p:attrNameLst>
                                           <p:attrName>ppt_x</p:attrName>
@@ -22689,7 +22858,7 @@
                                       <p:cBhvr additive="base">
                                         <p:cTn id="8" dur="500" fill="hold"/>
                                         <p:tgtEl>
-                                          <p:spTgt spid="7"/>
+                                          <p:spTgt spid="4"/>
                                         </p:tgtEl>
                                         <p:attrNameLst>
                                           <p:attrName>ppt_y</p:attrName>
@@ -22756,21 +22925,39 @@
                                   </p:childTnLst>
                                 </p:cTn>
                               </p:par>
+                            </p:childTnLst>
+                          </p:cTn>
+                        </p:par>
+                      </p:childTnLst>
+                    </p:cTn>
+                  </p:par>
+                  <p:par>
+                    <p:cTn id="13" fill="hold">
+                      <p:stCondLst>
+                        <p:cond delay="indefinite"/>
+                      </p:stCondLst>
+                      <p:childTnLst>
+                        <p:par>
+                          <p:cTn id="14" fill="hold">
+                            <p:stCondLst>
+                              <p:cond delay="0"/>
+                            </p:stCondLst>
+                            <p:childTnLst>
                               <p:par>
-                                <p:cTn id="13" presetID="1" presetClass="entr" presetSubtype="0" fill="hold" grpId="0" nodeType="withEffect">
+                                <p:cTn id="15" presetID="1" presetClass="entr" presetSubtype="0" fill="hold" grpId="0" nodeType="clickEffect">
                                   <p:stCondLst>
                                     <p:cond delay="0"/>
                                   </p:stCondLst>
                                   <p:childTnLst>
                                     <p:set>
                                       <p:cBhvr>
-                                        <p:cTn id="14" dur="1" fill="hold">
+                                        <p:cTn id="16" dur="1" fill="hold">
                                           <p:stCondLst>
                                             <p:cond delay="0"/>
                                           </p:stCondLst>
                                         </p:cTn>
                                         <p:tgtEl>
-                                          <p:spTgt spid="8"/>
+                                          <p:spTgt spid="10"/>
                                         </p:tgtEl>
                                         <p:attrNameLst>
                                           <p:attrName>style.visibility</p:attrName>
@@ -22780,6 +22967,726 @@
                                         <p:strVal val="visible"/>
                                       </p:to>
                                     </p:set>
+                                  </p:childTnLst>
+                                </p:cTn>
+                              </p:par>
+                            </p:childTnLst>
+                          </p:cTn>
+                        </p:par>
+                      </p:childTnLst>
+                    </p:cTn>
+                  </p:par>
+                  <p:par>
+                    <p:cTn id="17" fill="hold">
+                      <p:stCondLst>
+                        <p:cond delay="indefinite"/>
+                      </p:stCondLst>
+                      <p:childTnLst>
+                        <p:par>
+                          <p:cTn id="18" fill="hold">
+                            <p:stCondLst>
+                              <p:cond delay="0"/>
+                            </p:stCondLst>
+                            <p:childTnLst>
+                              <p:par>
+                                <p:cTn id="19" presetID="2" presetClass="entr" presetSubtype="4" fill="hold" grpId="0" nodeType="clickEffect">
+                                  <p:stCondLst>
+                                    <p:cond delay="0"/>
+                                  </p:stCondLst>
+                                  <p:childTnLst>
+                                    <p:set>
+                                      <p:cBhvr>
+                                        <p:cTn id="20" dur="1" fill="hold">
+                                          <p:stCondLst>
+                                            <p:cond delay="0"/>
+                                          </p:stCondLst>
+                                        </p:cTn>
+                                        <p:tgtEl>
+                                          <p:spTgt spid="3">
+                                            <p:txEl>
+                                              <p:pRg st="0" end="0"/>
+                                            </p:txEl>
+                                          </p:spTgt>
+                                        </p:tgtEl>
+                                        <p:attrNameLst>
+                                          <p:attrName>style.visibility</p:attrName>
+                                        </p:attrNameLst>
+                                      </p:cBhvr>
+                                      <p:to>
+                                        <p:strVal val="visible"/>
+                                      </p:to>
+                                    </p:set>
+                                    <p:anim calcmode="lin" valueType="num">
+                                      <p:cBhvr additive="base">
+                                        <p:cTn id="21" dur="500" fill="hold"/>
+                                        <p:tgtEl>
+                                          <p:spTgt spid="3">
+                                            <p:txEl>
+                                              <p:pRg st="0" end="0"/>
+                                            </p:txEl>
+                                          </p:spTgt>
+                                        </p:tgtEl>
+                                        <p:attrNameLst>
+                                          <p:attrName>ppt_x</p:attrName>
+                                        </p:attrNameLst>
+                                      </p:cBhvr>
+                                      <p:tavLst>
+                                        <p:tav tm="0">
+                                          <p:val>
+                                            <p:strVal val="#ppt_x"/>
+                                          </p:val>
+                                        </p:tav>
+                                        <p:tav tm="100000">
+                                          <p:val>
+                                            <p:strVal val="#ppt_x"/>
+                                          </p:val>
+                                        </p:tav>
+                                      </p:tavLst>
+                                    </p:anim>
+                                    <p:anim calcmode="lin" valueType="num">
+                                      <p:cBhvr additive="base">
+                                        <p:cTn id="22" dur="500" fill="hold"/>
+                                        <p:tgtEl>
+                                          <p:spTgt spid="3">
+                                            <p:txEl>
+                                              <p:pRg st="0" end="0"/>
+                                            </p:txEl>
+                                          </p:spTgt>
+                                        </p:tgtEl>
+                                        <p:attrNameLst>
+                                          <p:attrName>ppt_y</p:attrName>
+                                        </p:attrNameLst>
+                                      </p:cBhvr>
+                                      <p:tavLst>
+                                        <p:tav tm="0">
+                                          <p:val>
+                                            <p:strVal val="1+#ppt_h/2"/>
+                                          </p:val>
+                                        </p:tav>
+                                        <p:tav tm="100000">
+                                          <p:val>
+                                            <p:strVal val="#ppt_y"/>
+                                          </p:val>
+                                        </p:tav>
+                                      </p:tavLst>
+                                    </p:anim>
+                                  </p:childTnLst>
+                                </p:cTn>
+                              </p:par>
+                            </p:childTnLst>
+                          </p:cTn>
+                        </p:par>
+                      </p:childTnLst>
+                    </p:cTn>
+                  </p:par>
+                  <p:par>
+                    <p:cTn id="23" fill="hold">
+                      <p:stCondLst>
+                        <p:cond delay="indefinite"/>
+                      </p:stCondLst>
+                      <p:childTnLst>
+                        <p:par>
+                          <p:cTn id="24" fill="hold">
+                            <p:stCondLst>
+                              <p:cond delay="0"/>
+                            </p:stCondLst>
+                            <p:childTnLst>
+                              <p:par>
+                                <p:cTn id="25" presetID="2" presetClass="entr" presetSubtype="4" fill="hold" grpId="0" nodeType="clickEffect">
+                                  <p:stCondLst>
+                                    <p:cond delay="0"/>
+                                  </p:stCondLst>
+                                  <p:childTnLst>
+                                    <p:set>
+                                      <p:cBhvr>
+                                        <p:cTn id="26" dur="1" fill="hold">
+                                          <p:stCondLst>
+                                            <p:cond delay="0"/>
+                                          </p:stCondLst>
+                                        </p:cTn>
+                                        <p:tgtEl>
+                                          <p:spTgt spid="3">
+                                            <p:txEl>
+                                              <p:pRg st="1" end="1"/>
+                                            </p:txEl>
+                                          </p:spTgt>
+                                        </p:tgtEl>
+                                        <p:attrNameLst>
+                                          <p:attrName>style.visibility</p:attrName>
+                                        </p:attrNameLst>
+                                      </p:cBhvr>
+                                      <p:to>
+                                        <p:strVal val="visible"/>
+                                      </p:to>
+                                    </p:set>
+                                    <p:anim calcmode="lin" valueType="num">
+                                      <p:cBhvr additive="base">
+                                        <p:cTn id="27" dur="500" fill="hold"/>
+                                        <p:tgtEl>
+                                          <p:spTgt spid="3">
+                                            <p:txEl>
+                                              <p:pRg st="1" end="1"/>
+                                            </p:txEl>
+                                          </p:spTgt>
+                                        </p:tgtEl>
+                                        <p:attrNameLst>
+                                          <p:attrName>ppt_x</p:attrName>
+                                        </p:attrNameLst>
+                                      </p:cBhvr>
+                                      <p:tavLst>
+                                        <p:tav tm="0">
+                                          <p:val>
+                                            <p:strVal val="#ppt_x"/>
+                                          </p:val>
+                                        </p:tav>
+                                        <p:tav tm="100000">
+                                          <p:val>
+                                            <p:strVal val="#ppt_x"/>
+                                          </p:val>
+                                        </p:tav>
+                                      </p:tavLst>
+                                    </p:anim>
+                                    <p:anim calcmode="lin" valueType="num">
+                                      <p:cBhvr additive="base">
+                                        <p:cTn id="28" dur="500" fill="hold"/>
+                                        <p:tgtEl>
+                                          <p:spTgt spid="3">
+                                            <p:txEl>
+                                              <p:pRg st="1" end="1"/>
+                                            </p:txEl>
+                                          </p:spTgt>
+                                        </p:tgtEl>
+                                        <p:attrNameLst>
+                                          <p:attrName>ppt_y</p:attrName>
+                                        </p:attrNameLst>
+                                      </p:cBhvr>
+                                      <p:tavLst>
+                                        <p:tav tm="0">
+                                          <p:val>
+                                            <p:strVal val="1+#ppt_h/2"/>
+                                          </p:val>
+                                        </p:tav>
+                                        <p:tav tm="100000">
+                                          <p:val>
+                                            <p:strVal val="#ppt_y"/>
+                                          </p:val>
+                                        </p:tav>
+                                      </p:tavLst>
+                                    </p:anim>
+                                  </p:childTnLst>
+                                </p:cTn>
+                              </p:par>
+                            </p:childTnLst>
+                          </p:cTn>
+                        </p:par>
+                      </p:childTnLst>
+                    </p:cTn>
+                  </p:par>
+                  <p:par>
+                    <p:cTn id="29" fill="hold">
+                      <p:stCondLst>
+                        <p:cond delay="indefinite"/>
+                      </p:stCondLst>
+                      <p:childTnLst>
+                        <p:par>
+                          <p:cTn id="30" fill="hold">
+                            <p:stCondLst>
+                              <p:cond delay="0"/>
+                            </p:stCondLst>
+                            <p:childTnLst>
+                              <p:par>
+                                <p:cTn id="31" presetID="2" presetClass="entr" presetSubtype="4" fill="hold" grpId="0" nodeType="clickEffect">
+                                  <p:stCondLst>
+                                    <p:cond delay="0"/>
+                                  </p:stCondLst>
+                                  <p:childTnLst>
+                                    <p:set>
+                                      <p:cBhvr>
+                                        <p:cTn id="32" dur="1" fill="hold">
+                                          <p:stCondLst>
+                                            <p:cond delay="0"/>
+                                          </p:stCondLst>
+                                        </p:cTn>
+                                        <p:tgtEl>
+                                          <p:spTgt spid="3">
+                                            <p:txEl>
+                                              <p:pRg st="2" end="2"/>
+                                            </p:txEl>
+                                          </p:spTgt>
+                                        </p:tgtEl>
+                                        <p:attrNameLst>
+                                          <p:attrName>style.visibility</p:attrName>
+                                        </p:attrNameLst>
+                                      </p:cBhvr>
+                                      <p:to>
+                                        <p:strVal val="visible"/>
+                                      </p:to>
+                                    </p:set>
+                                    <p:anim calcmode="lin" valueType="num">
+                                      <p:cBhvr additive="base">
+                                        <p:cTn id="33" dur="500" fill="hold"/>
+                                        <p:tgtEl>
+                                          <p:spTgt spid="3">
+                                            <p:txEl>
+                                              <p:pRg st="2" end="2"/>
+                                            </p:txEl>
+                                          </p:spTgt>
+                                        </p:tgtEl>
+                                        <p:attrNameLst>
+                                          <p:attrName>ppt_x</p:attrName>
+                                        </p:attrNameLst>
+                                      </p:cBhvr>
+                                      <p:tavLst>
+                                        <p:tav tm="0">
+                                          <p:val>
+                                            <p:strVal val="#ppt_x"/>
+                                          </p:val>
+                                        </p:tav>
+                                        <p:tav tm="100000">
+                                          <p:val>
+                                            <p:strVal val="#ppt_x"/>
+                                          </p:val>
+                                        </p:tav>
+                                      </p:tavLst>
+                                    </p:anim>
+                                    <p:anim calcmode="lin" valueType="num">
+                                      <p:cBhvr additive="base">
+                                        <p:cTn id="34" dur="500" fill="hold"/>
+                                        <p:tgtEl>
+                                          <p:spTgt spid="3">
+                                            <p:txEl>
+                                              <p:pRg st="2" end="2"/>
+                                            </p:txEl>
+                                          </p:spTgt>
+                                        </p:tgtEl>
+                                        <p:attrNameLst>
+                                          <p:attrName>ppt_y</p:attrName>
+                                        </p:attrNameLst>
+                                      </p:cBhvr>
+                                      <p:tavLst>
+                                        <p:tav tm="0">
+                                          <p:val>
+                                            <p:strVal val="1+#ppt_h/2"/>
+                                          </p:val>
+                                        </p:tav>
+                                        <p:tav tm="100000">
+                                          <p:val>
+                                            <p:strVal val="#ppt_y"/>
+                                          </p:val>
+                                        </p:tav>
+                                      </p:tavLst>
+                                    </p:anim>
+                                  </p:childTnLst>
+                                </p:cTn>
+                              </p:par>
+                            </p:childTnLst>
+                          </p:cTn>
+                        </p:par>
+                      </p:childTnLst>
+                    </p:cTn>
+                  </p:par>
+                </p:childTnLst>
+              </p:cTn>
+              <p:prevCondLst>
+                <p:cond evt="onPrev" delay="0">
+                  <p:tgtEl>
+                    <p:sldTgt/>
+                  </p:tgtEl>
+                </p:cond>
+              </p:prevCondLst>
+              <p:nextCondLst>
+                <p:cond evt="onNext" delay="0">
+                  <p:tgtEl>
+                    <p:sldTgt/>
+                  </p:tgtEl>
+                </p:cond>
+              </p:nextCondLst>
+            </p:seq>
+          </p:childTnLst>
+        </p:cTn>
+      </p:par>
+    </p:tnLst>
+    <p:bldLst>
+      <p:bldP spid="3" grpId="0" build="p"/>
+      <p:bldP spid="9" grpId="0" animBg="1"/>
+      <p:bldP spid="10" grpId="0" animBg="1"/>
+    </p:bldLst>
+  </p:timing>
+</p:sld>
+</file>
+
+<file path=ppt/slides/slide26.xml><?xml version="1.0" encoding="utf-8"?>
+<p:sld xmlns:a="http://schemas.openxmlformats.org/drawingml/2006/main" xmlns:r="http://schemas.openxmlformats.org/officeDocument/2006/relationships" xmlns:p="http://schemas.openxmlformats.org/presentationml/2006/main">
+  <p:cSld>
+    <p:spTree>
+      <p:nvGrpSpPr>
+        <p:cNvPr id="1" name=""/>
+        <p:cNvGrpSpPr/>
+        <p:nvPr/>
+      </p:nvGrpSpPr>
+      <p:grpSpPr>
+        <a:xfrm>
+          <a:off x="0" y="0"/>
+          <a:ext cx="0" cy="0"/>
+          <a:chOff x="0" y="0"/>
+          <a:chExt cx="0" cy="0"/>
+        </a:xfrm>
+      </p:grpSpPr>
+      <p:sp>
+        <p:nvSpPr>
+          <p:cNvPr id="2" name="Title 1"/>
+          <p:cNvSpPr>
+            <a:spLocks noGrp="1"/>
+          </p:cNvSpPr>
+          <p:nvPr>
+            <p:ph type="title"/>
+          </p:nvPr>
+        </p:nvSpPr>
+        <p:spPr/>
+        <p:txBody>
+          <a:bodyPr/>
+          <a:lstStyle/>
+          <a:p>
+            <a:r>
+              <a:rPr lang="en-IN" dirty="0" smtClean="0"/>
+              <a:t>Hyper Parameter Tuning</a:t>
+            </a:r>
+            <a:endParaRPr lang="de-DE" dirty="0"/>
+          </a:p>
+        </p:txBody>
+      </p:sp>
+      <p:sp>
+        <p:nvSpPr>
+          <p:cNvPr id="3" name="Content Placeholder 2"/>
+          <p:cNvSpPr>
+            <a:spLocks noGrp="1"/>
+          </p:cNvSpPr>
+          <p:nvPr>
+            <p:ph idx="1"/>
+          </p:nvPr>
+        </p:nvSpPr>
+        <p:spPr>
+          <a:xfrm>
+            <a:off x="677334" y="4511904"/>
+            <a:ext cx="8596668" cy="1240108"/>
+          </a:xfrm>
+        </p:spPr>
+        <p:txBody>
+          <a:bodyPr/>
+          <a:lstStyle/>
+          <a:p>
+            <a:r>
+              <a:rPr lang="en-IN" dirty="0"/>
+              <a:t>By using Hyper Parameter Tuning </a:t>
+            </a:r>
+            <a:r>
+              <a:rPr lang="en-IN" dirty="0" err="1"/>
+              <a:t>XGBoost</a:t>
+            </a:r>
+            <a:r>
+              <a:rPr lang="en-IN" dirty="0"/>
+              <a:t> was performing better than Random Forest. So created Final Model using </a:t>
+            </a:r>
+            <a:r>
+              <a:rPr lang="en-IN" dirty="0" err="1"/>
+              <a:t>XGBoost</a:t>
+            </a:r>
+            <a:r>
+              <a:rPr lang="en-IN" dirty="0"/>
+              <a:t> Classifier</a:t>
+            </a:r>
+            <a:r>
+              <a:rPr lang="en-IN" dirty="0" smtClean="0"/>
+              <a:t>.</a:t>
+            </a:r>
+            <a:endParaRPr lang="de-DE" dirty="0"/>
+          </a:p>
+        </p:txBody>
+      </p:sp>
+      <p:sp>
+        <p:nvSpPr>
+          <p:cNvPr id="4" name="Rectangle 3"/>
+          <p:cNvSpPr/>
+          <p:nvPr/>
+        </p:nvSpPr>
+        <p:spPr>
+          <a:xfrm>
+            <a:off x="677334" y="1635874"/>
+            <a:ext cx="6096000" cy="923330"/>
+          </a:xfrm>
+          <a:prstGeom prst="rect">
+            <a:avLst/>
+          </a:prstGeom>
+        </p:spPr>
+        <p:txBody>
+          <a:bodyPr>
+            <a:spAutoFit/>
+          </a:bodyPr>
+          <a:lstStyle/>
+          <a:p>
+            <a:r>
+              <a:rPr lang="de-DE" dirty="0" smtClean="0"/>
+              <a:t>rf_best </a:t>
+            </a:r>
+            <a:r>
+              <a:rPr lang="de-DE" dirty="0"/>
+              <a:t>Best Score </a:t>
+            </a:r>
+            <a:r>
+              <a:rPr lang="de-DE" dirty="0" smtClean="0">
+                <a:solidFill>
+                  <a:srgbClr val="92D050"/>
+                </a:solidFill>
+              </a:rPr>
+              <a:t>0.7323300433627349</a:t>
+            </a:r>
+            <a:endParaRPr lang="de-DE" dirty="0">
+              <a:solidFill>
+                <a:srgbClr val="92D050"/>
+              </a:solidFill>
+            </a:endParaRPr>
+          </a:p>
+          <a:p>
+            <a:r>
+              <a:rPr lang="de-DE" dirty="0"/>
+              <a:t>rf_best Best Parmas {'max_depth': 9, 'max_features': None, 'max_leaf_nodes': None, 'n_estimators': 150}</a:t>
+            </a:r>
+          </a:p>
+        </p:txBody>
+      </p:sp>
+      <p:sp>
+        <p:nvSpPr>
+          <p:cNvPr id="6" name="Rectangle 5"/>
+          <p:cNvSpPr/>
+          <p:nvPr/>
+        </p:nvSpPr>
+        <p:spPr>
+          <a:xfrm>
+            <a:off x="677334" y="3036836"/>
+            <a:ext cx="6096000" cy="923330"/>
+          </a:xfrm>
+          <a:prstGeom prst="rect">
+            <a:avLst/>
+          </a:prstGeom>
+        </p:spPr>
+        <p:txBody>
+          <a:bodyPr>
+            <a:spAutoFit/>
+          </a:bodyPr>
+          <a:lstStyle/>
+          <a:p>
+            <a:r>
+              <a:rPr lang="de-DE" dirty="0"/>
+              <a:t>xgbr_best Best Score </a:t>
+            </a:r>
+            <a:r>
+              <a:rPr lang="de-DE" dirty="0">
+                <a:solidFill>
+                  <a:srgbClr val="92D050"/>
+                </a:solidFill>
+              </a:rPr>
+              <a:t>0.7929967186797758</a:t>
+            </a:r>
+          </a:p>
+          <a:p>
+            <a:r>
+              <a:rPr lang="de-DE" dirty="0"/>
+              <a:t>xgbr_best Best Parmas {'alpha': 1, 'learning_rate': 0.1, 'max_depth': 10, 'n_estimators': 300}</a:t>
+            </a:r>
+          </a:p>
+        </p:txBody>
+      </p:sp>
+    </p:spTree>
+    <p:extLst>
+      <p:ext uri="{BB962C8B-B14F-4D97-AF65-F5344CB8AC3E}">
+        <p14:creationId xmlns:p14="http://schemas.microsoft.com/office/powerpoint/2010/main" val="4252033089"/>
+      </p:ext>
+    </p:extLst>
+  </p:cSld>
+  <p:clrMapOvr>
+    <a:masterClrMapping/>
+  </p:clrMapOvr>
+  <p:timing>
+    <p:tnLst>
+      <p:par>
+        <p:cTn id="1" dur="indefinite" restart="never" nodeType="tmRoot">
+          <p:childTnLst>
+            <p:seq concurrent="1" nextAc="seek">
+              <p:cTn id="2" dur="indefinite" nodeType="mainSeq">
+                <p:childTnLst>
+                  <p:par>
+                    <p:cTn id="3" fill="hold">
+                      <p:stCondLst>
+                        <p:cond delay="indefinite"/>
+                      </p:stCondLst>
+                      <p:childTnLst>
+                        <p:par>
+                          <p:cTn id="4" fill="hold">
+                            <p:stCondLst>
+                              <p:cond delay="0"/>
+                            </p:stCondLst>
+                            <p:childTnLst>
+                              <p:par>
+                                <p:cTn id="5" presetID="2" presetClass="entr" presetSubtype="4" fill="hold" grpId="0" nodeType="clickEffect">
+                                  <p:stCondLst>
+                                    <p:cond delay="0"/>
+                                  </p:stCondLst>
+                                  <p:childTnLst>
+                                    <p:set>
+                                      <p:cBhvr>
+                                        <p:cTn id="6" dur="1" fill="hold">
+                                          <p:stCondLst>
+                                            <p:cond delay="0"/>
+                                          </p:stCondLst>
+                                        </p:cTn>
+                                        <p:tgtEl>
+                                          <p:spTgt spid="4"/>
+                                        </p:tgtEl>
+                                        <p:attrNameLst>
+                                          <p:attrName>style.visibility</p:attrName>
+                                        </p:attrNameLst>
+                                      </p:cBhvr>
+                                      <p:to>
+                                        <p:strVal val="visible"/>
+                                      </p:to>
+                                    </p:set>
+                                    <p:anim calcmode="lin" valueType="num">
+                                      <p:cBhvr additive="base">
+                                        <p:cTn id="7" dur="500" fill="hold"/>
+                                        <p:tgtEl>
+                                          <p:spTgt spid="4"/>
+                                        </p:tgtEl>
+                                        <p:attrNameLst>
+                                          <p:attrName>ppt_x</p:attrName>
+                                        </p:attrNameLst>
+                                      </p:cBhvr>
+                                      <p:tavLst>
+                                        <p:tav tm="0">
+                                          <p:val>
+                                            <p:strVal val="#ppt_x"/>
+                                          </p:val>
+                                        </p:tav>
+                                        <p:tav tm="100000">
+                                          <p:val>
+                                            <p:strVal val="#ppt_x"/>
+                                          </p:val>
+                                        </p:tav>
+                                      </p:tavLst>
+                                    </p:anim>
+                                    <p:anim calcmode="lin" valueType="num">
+                                      <p:cBhvr additive="base">
+                                        <p:cTn id="8" dur="500" fill="hold"/>
+                                        <p:tgtEl>
+                                          <p:spTgt spid="4"/>
+                                        </p:tgtEl>
+                                        <p:attrNameLst>
+                                          <p:attrName>ppt_y</p:attrName>
+                                        </p:attrNameLst>
+                                      </p:cBhvr>
+                                      <p:tavLst>
+                                        <p:tav tm="0">
+                                          <p:val>
+                                            <p:strVal val="1+#ppt_h/2"/>
+                                          </p:val>
+                                        </p:tav>
+                                        <p:tav tm="100000">
+                                          <p:val>
+                                            <p:strVal val="#ppt_y"/>
+                                          </p:val>
+                                        </p:tav>
+                                      </p:tavLst>
+                                    </p:anim>
+                                  </p:childTnLst>
+                                </p:cTn>
+                              </p:par>
+                            </p:childTnLst>
+                          </p:cTn>
+                        </p:par>
+                      </p:childTnLst>
+                    </p:cTn>
+                  </p:par>
+                  <p:par>
+                    <p:cTn id="9" fill="hold">
+                      <p:stCondLst>
+                        <p:cond delay="indefinite"/>
+                      </p:stCondLst>
+                      <p:childTnLst>
+                        <p:par>
+                          <p:cTn id="10" fill="hold">
+                            <p:stCondLst>
+                              <p:cond delay="0"/>
+                            </p:stCondLst>
+                            <p:childTnLst>
+                              <p:par>
+                                <p:cTn id="11" presetID="2" presetClass="entr" presetSubtype="4" fill="hold" grpId="0" nodeType="clickEffect">
+                                  <p:stCondLst>
+                                    <p:cond delay="0"/>
+                                  </p:stCondLst>
+                                  <p:childTnLst>
+                                    <p:set>
+                                      <p:cBhvr>
+                                        <p:cTn id="12" dur="1" fill="hold">
+                                          <p:stCondLst>
+                                            <p:cond delay="0"/>
+                                          </p:stCondLst>
+                                        </p:cTn>
+                                        <p:tgtEl>
+                                          <p:spTgt spid="6"/>
+                                        </p:tgtEl>
+                                        <p:attrNameLst>
+                                          <p:attrName>style.visibility</p:attrName>
+                                        </p:attrNameLst>
+                                      </p:cBhvr>
+                                      <p:to>
+                                        <p:strVal val="visible"/>
+                                      </p:to>
+                                    </p:set>
+                                    <p:anim calcmode="lin" valueType="num">
+                                      <p:cBhvr additive="base">
+                                        <p:cTn id="13" dur="500" fill="hold"/>
+                                        <p:tgtEl>
+                                          <p:spTgt spid="6"/>
+                                        </p:tgtEl>
+                                        <p:attrNameLst>
+                                          <p:attrName>ppt_x</p:attrName>
+                                        </p:attrNameLst>
+                                      </p:cBhvr>
+                                      <p:tavLst>
+                                        <p:tav tm="0">
+                                          <p:val>
+                                            <p:strVal val="#ppt_x"/>
+                                          </p:val>
+                                        </p:tav>
+                                        <p:tav tm="100000">
+                                          <p:val>
+                                            <p:strVal val="#ppt_x"/>
+                                          </p:val>
+                                        </p:tav>
+                                      </p:tavLst>
+                                    </p:anim>
+                                    <p:anim calcmode="lin" valueType="num">
+                                      <p:cBhvr additive="base">
+                                        <p:cTn id="14" dur="500" fill="hold"/>
+                                        <p:tgtEl>
+                                          <p:spTgt spid="6"/>
+                                        </p:tgtEl>
+                                        <p:attrNameLst>
+                                          <p:attrName>ppt_y</p:attrName>
+                                        </p:attrNameLst>
+                                      </p:cBhvr>
+                                      <p:tavLst>
+                                        <p:tav tm="0">
+                                          <p:val>
+                                            <p:strVal val="1+#ppt_h/2"/>
+                                          </p:val>
+                                        </p:tav>
+                                        <p:tav tm="100000">
+                                          <p:val>
+                                            <p:strVal val="#ppt_y"/>
+                                          </p:val>
+                                        </p:tav>
+                                      </p:tavLst>
+                                    </p:anim>
                                   </p:childTnLst>
                                 </p:cTn>
                               </p:par>
@@ -22892,315 +23799,6 @@
                       </p:childTnLst>
                     </p:cTn>
                   </p:par>
-                  <p:par>
-                    <p:cTn id="21" fill="hold">
-                      <p:stCondLst>
-                        <p:cond delay="indefinite"/>
-                      </p:stCondLst>
-                      <p:childTnLst>
-                        <p:par>
-                          <p:cTn id="22" fill="hold">
-                            <p:stCondLst>
-                              <p:cond delay="0"/>
-                            </p:stCondLst>
-                            <p:childTnLst>
-                              <p:par>
-                                <p:cTn id="23" presetID="2" presetClass="entr" presetSubtype="4" fill="hold" grpId="0" nodeType="clickEffect">
-                                  <p:stCondLst>
-                                    <p:cond delay="0"/>
-                                  </p:stCondLst>
-                                  <p:childTnLst>
-                                    <p:set>
-                                      <p:cBhvr>
-                                        <p:cTn id="24" dur="1" fill="hold">
-                                          <p:stCondLst>
-                                            <p:cond delay="0"/>
-                                          </p:stCondLst>
-                                        </p:cTn>
-                                        <p:tgtEl>
-                                          <p:spTgt spid="3">
-                                            <p:txEl>
-                                              <p:pRg st="1" end="1"/>
-                                            </p:txEl>
-                                          </p:spTgt>
-                                        </p:tgtEl>
-                                        <p:attrNameLst>
-                                          <p:attrName>style.visibility</p:attrName>
-                                        </p:attrNameLst>
-                                      </p:cBhvr>
-                                      <p:to>
-                                        <p:strVal val="visible"/>
-                                      </p:to>
-                                    </p:set>
-                                    <p:anim calcmode="lin" valueType="num">
-                                      <p:cBhvr additive="base">
-                                        <p:cTn id="25" dur="500" fill="hold"/>
-                                        <p:tgtEl>
-                                          <p:spTgt spid="3">
-                                            <p:txEl>
-                                              <p:pRg st="1" end="1"/>
-                                            </p:txEl>
-                                          </p:spTgt>
-                                        </p:tgtEl>
-                                        <p:attrNameLst>
-                                          <p:attrName>ppt_x</p:attrName>
-                                        </p:attrNameLst>
-                                      </p:cBhvr>
-                                      <p:tavLst>
-                                        <p:tav tm="0">
-                                          <p:val>
-                                            <p:strVal val="#ppt_x"/>
-                                          </p:val>
-                                        </p:tav>
-                                        <p:tav tm="100000">
-                                          <p:val>
-                                            <p:strVal val="#ppt_x"/>
-                                          </p:val>
-                                        </p:tav>
-                                      </p:tavLst>
-                                    </p:anim>
-                                    <p:anim calcmode="lin" valueType="num">
-                                      <p:cBhvr additive="base">
-                                        <p:cTn id="26" dur="500" fill="hold"/>
-                                        <p:tgtEl>
-                                          <p:spTgt spid="3">
-                                            <p:txEl>
-                                              <p:pRg st="1" end="1"/>
-                                            </p:txEl>
-                                          </p:spTgt>
-                                        </p:tgtEl>
-                                        <p:attrNameLst>
-                                          <p:attrName>ppt_y</p:attrName>
-                                        </p:attrNameLst>
-                                      </p:cBhvr>
-                                      <p:tavLst>
-                                        <p:tav tm="0">
-                                          <p:val>
-                                            <p:strVal val="1+#ppt_h/2"/>
-                                          </p:val>
-                                        </p:tav>
-                                        <p:tav tm="100000">
-                                          <p:val>
-                                            <p:strVal val="#ppt_y"/>
-                                          </p:val>
-                                        </p:tav>
-                                      </p:tavLst>
-                                    </p:anim>
-                                  </p:childTnLst>
-                                </p:cTn>
-                              </p:par>
-                            </p:childTnLst>
-                          </p:cTn>
-                        </p:par>
-                      </p:childTnLst>
-                    </p:cTn>
-                  </p:par>
-                  <p:par>
-                    <p:cTn id="27" fill="hold">
-                      <p:stCondLst>
-                        <p:cond delay="indefinite"/>
-                      </p:stCondLst>
-                      <p:childTnLst>
-                        <p:par>
-                          <p:cTn id="28" fill="hold">
-                            <p:stCondLst>
-                              <p:cond delay="0"/>
-                            </p:stCondLst>
-                            <p:childTnLst>
-                              <p:par>
-                                <p:cTn id="29" presetID="2" presetClass="entr" presetSubtype="4" fill="hold" grpId="0" nodeType="clickEffect">
-                                  <p:stCondLst>
-                                    <p:cond delay="0"/>
-                                  </p:stCondLst>
-                                  <p:childTnLst>
-                                    <p:set>
-                                      <p:cBhvr>
-                                        <p:cTn id="30" dur="1" fill="hold">
-                                          <p:stCondLst>
-                                            <p:cond delay="0"/>
-                                          </p:stCondLst>
-                                        </p:cTn>
-                                        <p:tgtEl>
-                                          <p:spTgt spid="3">
-                                            <p:txEl>
-                                              <p:pRg st="2" end="2"/>
-                                            </p:txEl>
-                                          </p:spTgt>
-                                        </p:tgtEl>
-                                        <p:attrNameLst>
-                                          <p:attrName>style.visibility</p:attrName>
-                                        </p:attrNameLst>
-                                      </p:cBhvr>
-                                      <p:to>
-                                        <p:strVal val="visible"/>
-                                      </p:to>
-                                    </p:set>
-                                    <p:anim calcmode="lin" valueType="num">
-                                      <p:cBhvr additive="base">
-                                        <p:cTn id="31" dur="500" fill="hold"/>
-                                        <p:tgtEl>
-                                          <p:spTgt spid="3">
-                                            <p:txEl>
-                                              <p:pRg st="2" end="2"/>
-                                            </p:txEl>
-                                          </p:spTgt>
-                                        </p:tgtEl>
-                                        <p:attrNameLst>
-                                          <p:attrName>ppt_x</p:attrName>
-                                        </p:attrNameLst>
-                                      </p:cBhvr>
-                                      <p:tavLst>
-                                        <p:tav tm="0">
-                                          <p:val>
-                                            <p:strVal val="#ppt_x"/>
-                                          </p:val>
-                                        </p:tav>
-                                        <p:tav tm="100000">
-                                          <p:val>
-                                            <p:strVal val="#ppt_x"/>
-                                          </p:val>
-                                        </p:tav>
-                                      </p:tavLst>
-                                    </p:anim>
-                                    <p:anim calcmode="lin" valueType="num">
-                                      <p:cBhvr additive="base">
-                                        <p:cTn id="32" dur="500" fill="hold"/>
-                                        <p:tgtEl>
-                                          <p:spTgt spid="3">
-                                            <p:txEl>
-                                              <p:pRg st="2" end="2"/>
-                                            </p:txEl>
-                                          </p:spTgt>
-                                        </p:tgtEl>
-                                        <p:attrNameLst>
-                                          <p:attrName>ppt_y</p:attrName>
-                                        </p:attrNameLst>
-                                      </p:cBhvr>
-                                      <p:tavLst>
-                                        <p:tav tm="0">
-                                          <p:val>
-                                            <p:strVal val="1+#ppt_h/2"/>
-                                          </p:val>
-                                        </p:tav>
-                                        <p:tav tm="100000">
-                                          <p:val>
-                                            <p:strVal val="#ppt_y"/>
-                                          </p:val>
-                                        </p:tav>
-                                      </p:tavLst>
-                                    </p:anim>
-                                  </p:childTnLst>
-                                </p:cTn>
-                              </p:par>
-                            </p:childTnLst>
-                          </p:cTn>
-                        </p:par>
-                      </p:childTnLst>
-                    </p:cTn>
-                  </p:par>
-                  <p:par>
-                    <p:cTn id="33" fill="hold">
-                      <p:stCondLst>
-                        <p:cond delay="indefinite"/>
-                      </p:stCondLst>
-                      <p:childTnLst>
-                        <p:par>
-                          <p:cTn id="34" fill="hold">
-                            <p:stCondLst>
-                              <p:cond delay="0"/>
-                            </p:stCondLst>
-                            <p:childTnLst>
-                              <p:par>
-                                <p:cTn id="35" presetID="2" presetClass="entr" presetSubtype="4" fill="hold" grpId="0" nodeType="clickEffect">
-                                  <p:stCondLst>
-                                    <p:cond delay="0"/>
-                                  </p:stCondLst>
-                                  <p:childTnLst>
-                                    <p:set>
-                                      <p:cBhvr>
-                                        <p:cTn id="36" dur="1" fill="hold">
-                                          <p:stCondLst>
-                                            <p:cond delay="0"/>
-                                          </p:stCondLst>
-                                        </p:cTn>
-                                        <p:tgtEl>
-                                          <p:spTgt spid="3">
-                                            <p:txEl>
-                                              <p:pRg st="3" end="3"/>
-                                            </p:txEl>
-                                          </p:spTgt>
-                                        </p:tgtEl>
-                                        <p:attrNameLst>
-                                          <p:attrName>style.visibility</p:attrName>
-                                        </p:attrNameLst>
-                                      </p:cBhvr>
-                                      <p:to>
-                                        <p:strVal val="visible"/>
-                                      </p:to>
-                                    </p:set>
-                                    <p:anim calcmode="lin" valueType="num">
-                                      <p:cBhvr additive="base">
-                                        <p:cTn id="37" dur="500" fill="hold"/>
-                                        <p:tgtEl>
-                                          <p:spTgt spid="3">
-                                            <p:txEl>
-                                              <p:pRg st="3" end="3"/>
-                                            </p:txEl>
-                                          </p:spTgt>
-                                        </p:tgtEl>
-                                        <p:attrNameLst>
-                                          <p:attrName>ppt_x</p:attrName>
-                                        </p:attrNameLst>
-                                      </p:cBhvr>
-                                      <p:tavLst>
-                                        <p:tav tm="0">
-                                          <p:val>
-                                            <p:strVal val="#ppt_x"/>
-                                          </p:val>
-                                        </p:tav>
-                                        <p:tav tm="100000">
-                                          <p:val>
-                                            <p:strVal val="#ppt_x"/>
-                                          </p:val>
-                                        </p:tav>
-                                      </p:tavLst>
-                                    </p:anim>
-                                    <p:anim calcmode="lin" valueType="num">
-                                      <p:cBhvr additive="base">
-                                        <p:cTn id="38" dur="500" fill="hold"/>
-                                        <p:tgtEl>
-                                          <p:spTgt spid="3">
-                                            <p:txEl>
-                                              <p:pRg st="3" end="3"/>
-                                            </p:txEl>
-                                          </p:spTgt>
-                                        </p:tgtEl>
-                                        <p:attrNameLst>
-                                          <p:attrName>ppt_y</p:attrName>
-                                        </p:attrNameLst>
-                                      </p:cBhvr>
-                                      <p:tavLst>
-                                        <p:tav tm="0">
-                                          <p:val>
-                                            <p:strVal val="1+#ppt_h/2"/>
-                                          </p:val>
-                                        </p:tav>
-                                        <p:tav tm="100000">
-                                          <p:val>
-                                            <p:strVal val="#ppt_y"/>
-                                          </p:val>
-                                        </p:tav>
-                                      </p:tavLst>
-                                    </p:anim>
-                                  </p:childTnLst>
-                                </p:cTn>
-                              </p:par>
-                            </p:childTnLst>
-                          </p:cTn>
-                        </p:par>
-                      </p:childTnLst>
-                    </p:cTn>
-                  </p:par>
                 </p:childTnLst>
               </p:cTn>
               <p:prevCondLst>
@@ -23224,14 +23822,14 @@
     </p:tnLst>
     <p:bldLst>
       <p:bldP spid="3" grpId="0" build="p"/>
-      <p:bldP spid="8" grpId="0" animBg="1"/>
-      <p:bldP spid="9" grpId="0" animBg="1"/>
+      <p:bldP spid="4" grpId="0"/>
+      <p:bldP spid="6" grpId="0"/>
     </p:bldLst>
   </p:timing>
 </p:sld>
 </file>
 
-<file path=ppt/slides/slide26.xml><?xml version="1.0" encoding="utf-8"?>
+<file path=ppt/slides/slide27.xml><?xml version="1.0" encoding="utf-8"?>
 <p:sld xmlns:a="http://schemas.openxmlformats.org/drawingml/2006/main" xmlns:r="http://schemas.openxmlformats.org/officeDocument/2006/relationships" xmlns:p="http://schemas.openxmlformats.org/presentationml/2006/main">
   <p:cSld>
     <p:spTree>
@@ -23275,90 +23873,6 @@
           </a:p>
         </p:txBody>
       </p:sp>
-      <p:pic>
-        <p:nvPicPr>
-          <p:cNvPr id="4" name="Picture 3"/>
-          <p:cNvPicPr>
-            <a:picLocks noChangeAspect="1"/>
-          </p:cNvPicPr>
-          <p:nvPr/>
-        </p:nvPicPr>
-        <p:blipFill>
-          <a:blip r:embed="rId2"/>
-          <a:stretch>
-            <a:fillRect/>
-          </a:stretch>
-        </p:blipFill>
-        <p:spPr>
-          <a:xfrm>
-            <a:off x="677334" y="1270000"/>
-            <a:ext cx="4701947" cy="2362405"/>
-          </a:xfrm>
-          <a:prstGeom prst="rect">
-            <a:avLst/>
-          </a:prstGeom>
-        </p:spPr>
-      </p:pic>
-      <p:pic>
-        <p:nvPicPr>
-          <p:cNvPr id="5" name="Picture 4"/>
-          <p:cNvPicPr>
-            <a:picLocks noChangeAspect="1"/>
-          </p:cNvPicPr>
-          <p:nvPr/>
-        </p:nvPicPr>
-        <p:blipFill>
-          <a:blip r:embed="rId3">
-            <a:extLst>
-              <a:ext uri="{28A0092B-C50C-407E-A947-70E740481C1C}">
-                <a14:useLocalDpi xmlns:a14="http://schemas.microsoft.com/office/drawing/2010/main" val="0"/>
-              </a:ext>
-            </a:extLst>
-          </a:blip>
-          <a:stretch>
-            <a:fillRect/>
-          </a:stretch>
-        </p:blipFill>
-        <p:spPr>
-          <a:xfrm>
-            <a:off x="6979910" y="2862064"/>
-            <a:ext cx="5212090" cy="3995936"/>
-          </a:xfrm>
-          <a:prstGeom prst="rect">
-            <a:avLst/>
-          </a:prstGeom>
-        </p:spPr>
-      </p:pic>
-      <p:pic>
-        <p:nvPicPr>
-          <p:cNvPr id="6" name="Picture 5"/>
-          <p:cNvPicPr>
-            <a:picLocks noChangeAspect="1"/>
-          </p:cNvPicPr>
-          <p:nvPr/>
-        </p:nvPicPr>
-        <p:blipFill>
-          <a:blip r:embed="rId4">
-            <a:extLst>
-              <a:ext uri="{28A0092B-C50C-407E-A947-70E740481C1C}">
-                <a14:useLocalDpi xmlns:a14="http://schemas.microsoft.com/office/drawing/2010/main" val="0"/>
-              </a:ext>
-            </a:extLst>
-          </a:blip>
-          <a:stretch>
-            <a:fillRect/>
-          </a:stretch>
-        </p:blipFill>
-        <p:spPr>
-          <a:xfrm>
-            <a:off x="466970" y="3632405"/>
-            <a:ext cx="6299491" cy="3225595"/>
-          </a:xfrm>
-          <a:prstGeom prst="rect">
-            <a:avLst/>
-          </a:prstGeom>
-        </p:spPr>
-      </p:pic>
       <p:sp>
         <p:nvSpPr>
           <p:cNvPr id="7" name="Content Placeholder 2"/>
@@ -23610,20 +24124,35 @@
           <a:p>
             <a:r>
               <a:rPr lang="en-IN" dirty="0" smtClean="0"/>
-              <a:t>Accuracy – 77.4%</a:t>
+              <a:t>Accuracy – </a:t>
             </a:r>
+            <a:r>
+              <a:rPr lang="en-IN" dirty="0" smtClean="0"/>
+              <a:t>77.6%</a:t>
+            </a:r>
+            <a:endParaRPr lang="en-IN" dirty="0" smtClean="0"/>
           </a:p>
           <a:p>
             <a:r>
               <a:rPr lang="en-IN" dirty="0" smtClean="0"/>
-              <a:t>Precision and Recall – 77%</a:t>
+              <a:t>Precision and Recall – </a:t>
             </a:r>
+            <a:r>
+              <a:rPr lang="en-IN" dirty="0" smtClean="0"/>
+              <a:t>78%</a:t>
+            </a:r>
+            <a:endParaRPr lang="en-IN" dirty="0" smtClean="0"/>
           </a:p>
           <a:p>
             <a:r>
               <a:rPr lang="en-IN" dirty="0" smtClean="0"/>
-              <a:t>AUC – 86%.</a:t>
+              <a:t>AUC – </a:t>
             </a:r>
+            <a:r>
+              <a:rPr lang="en-IN" dirty="0" smtClean="0"/>
+              <a:t>85%.</a:t>
+            </a:r>
+            <a:endParaRPr lang="en-IN" dirty="0" smtClean="0"/>
           </a:p>
           <a:p>
             <a:r>
@@ -23636,6 +24165,90 @@
           </a:p>
         </p:txBody>
       </p:sp>
+      <p:pic>
+        <p:nvPicPr>
+          <p:cNvPr id="3" name="Picture 2"/>
+          <p:cNvPicPr>
+            <a:picLocks noChangeAspect="1"/>
+          </p:cNvPicPr>
+          <p:nvPr/>
+        </p:nvPicPr>
+        <p:blipFill>
+          <a:blip r:embed="rId2"/>
+          <a:stretch>
+            <a:fillRect/>
+          </a:stretch>
+        </p:blipFill>
+        <p:spPr>
+          <a:xfrm>
+            <a:off x="677333" y="1269999"/>
+            <a:ext cx="5695392" cy="2524761"/>
+          </a:xfrm>
+          <a:prstGeom prst="rect">
+            <a:avLst/>
+          </a:prstGeom>
+        </p:spPr>
+      </p:pic>
+      <p:pic>
+        <p:nvPicPr>
+          <p:cNvPr id="8" name="Picture 7"/>
+          <p:cNvPicPr>
+            <a:picLocks noChangeAspect="1"/>
+          </p:cNvPicPr>
+          <p:nvPr/>
+        </p:nvPicPr>
+        <p:blipFill>
+          <a:blip r:embed="rId3">
+            <a:extLst>
+              <a:ext uri="{28A0092B-C50C-407E-A947-70E740481C1C}">
+                <a14:useLocalDpi xmlns:a14="http://schemas.microsoft.com/office/drawing/2010/main" val="0"/>
+              </a:ext>
+            </a:extLst>
+          </a:blip>
+          <a:stretch>
+            <a:fillRect/>
+          </a:stretch>
+        </p:blipFill>
+        <p:spPr>
+          <a:xfrm>
+            <a:off x="6613184" y="2862064"/>
+            <a:ext cx="5212090" cy="3995936"/>
+          </a:xfrm>
+          <a:prstGeom prst="rect">
+            <a:avLst/>
+          </a:prstGeom>
+        </p:spPr>
+      </p:pic>
+      <p:pic>
+        <p:nvPicPr>
+          <p:cNvPr id="9" name="Picture 8"/>
+          <p:cNvPicPr>
+            <a:picLocks noChangeAspect="1"/>
+          </p:cNvPicPr>
+          <p:nvPr/>
+        </p:nvPicPr>
+        <p:blipFill>
+          <a:blip r:embed="rId4">
+            <a:extLst>
+              <a:ext uri="{28A0092B-C50C-407E-A947-70E740481C1C}">
+                <a14:useLocalDpi xmlns:a14="http://schemas.microsoft.com/office/drawing/2010/main" val="0"/>
+              </a:ext>
+            </a:extLst>
+          </a:blip>
+          <a:stretch>
+            <a:fillRect/>
+          </a:stretch>
+        </p:blipFill>
+        <p:spPr>
+          <a:xfrm>
+            <a:off x="555782" y="3930663"/>
+            <a:ext cx="5717002" cy="2927337"/>
+          </a:xfrm>
+          <a:prstGeom prst="rect">
+            <a:avLst/>
+          </a:prstGeom>
+        </p:spPr>
+      </p:pic>
     </p:spTree>
     <p:extLst>
       <p:ext uri="{BB962C8B-B14F-4D97-AF65-F5344CB8AC3E}">
@@ -23680,7 +24293,7 @@
                                           </p:stCondLst>
                                         </p:cTn>
                                         <p:tgtEl>
-                                          <p:spTgt spid="4"/>
+                                          <p:spTgt spid="3"/>
                                         </p:tgtEl>
                                         <p:attrNameLst>
                                           <p:attrName>style.visibility</p:attrName>
@@ -23694,7 +24307,7 @@
                                       <p:cBhvr additive="base">
                                         <p:cTn id="7" dur="500" fill="hold"/>
                                         <p:tgtEl>
-                                          <p:spTgt spid="4"/>
+                                          <p:spTgt spid="3"/>
                                         </p:tgtEl>
                                         <p:attrNameLst>
                                           <p:attrName>ppt_x</p:attrName>
@@ -23717,7 +24330,7 @@
                                       <p:cBhvr additive="base">
                                         <p:cTn id="8" dur="500" fill="hold"/>
                                         <p:tgtEl>
-                                          <p:spTgt spid="4"/>
+                                          <p:spTgt spid="3"/>
                                         </p:tgtEl>
                                         <p:attrNameLst>
                                           <p:attrName>ppt_y</p:attrName>
@@ -23771,7 +24384,7 @@
                                           </p:stCondLst>
                                         </p:cTn>
                                         <p:tgtEl>
-                                          <p:spTgt spid="6"/>
+                                          <p:spTgt spid="9"/>
                                         </p:tgtEl>
                                         <p:attrNameLst>
                                           <p:attrName>style.visibility</p:attrName>
@@ -23785,7 +24398,7 @@
                                       <p:cBhvr additive="base">
                                         <p:cTn id="13" dur="500" fill="hold"/>
                                         <p:tgtEl>
-                                          <p:spTgt spid="6"/>
+                                          <p:spTgt spid="9"/>
                                         </p:tgtEl>
                                         <p:attrNameLst>
                                           <p:attrName>ppt_x</p:attrName>
@@ -23808,7 +24421,7 @@
                                       <p:cBhvr additive="base">
                                         <p:cTn id="14" dur="500" fill="hold"/>
                                         <p:tgtEl>
-                                          <p:spTgt spid="6"/>
+                                          <p:spTgt spid="9"/>
                                         </p:tgtEl>
                                         <p:attrNameLst>
                                           <p:attrName>ppt_y</p:attrName>
@@ -23862,7 +24475,7 @@
                                           </p:stCondLst>
                                         </p:cTn>
                                         <p:tgtEl>
-                                          <p:spTgt spid="5"/>
+                                          <p:spTgt spid="8"/>
                                         </p:tgtEl>
                                         <p:attrNameLst>
                                           <p:attrName>style.visibility</p:attrName>
@@ -23876,7 +24489,7 @@
                                       <p:cBhvr additive="base">
                                         <p:cTn id="19" dur="500" fill="hold"/>
                                         <p:tgtEl>
-                                          <p:spTgt spid="5"/>
+                                          <p:spTgt spid="8"/>
                                         </p:tgtEl>
                                         <p:attrNameLst>
                                           <p:attrName>ppt_x</p:attrName>
@@ -23899,7 +24512,7 @@
                                       <p:cBhvr additive="base">
                                         <p:cTn id="20" dur="500" fill="hold"/>
                                         <p:tgtEl>
-                                          <p:spTgt spid="5"/>
+                                          <p:spTgt spid="8"/>
                                         </p:tgtEl>
                                         <p:attrNameLst>
                                           <p:attrName>ppt_y</p:attrName>
@@ -24367,7 +24980,7 @@
 </p:sld>
 </file>
 
-<file path=ppt/slides/slide27.xml><?xml version="1.0" encoding="utf-8"?>
+<file path=ppt/slides/slide28.xml><?xml version="1.0" encoding="utf-8"?>
 <p:sld xmlns:a="http://schemas.openxmlformats.org/drawingml/2006/main" xmlns:r="http://schemas.openxmlformats.org/officeDocument/2006/relationships" xmlns:p="http://schemas.openxmlformats.org/presentationml/2006/main">
   <p:cSld>
     <p:spTree>
@@ -24424,7 +25037,19 @@
           <a:p>
             <a:r>
               <a:rPr lang="en-IN" dirty="0" smtClean="0"/>
-              <a:t>With 77.4% Accuracy we can now predict if the customer will accept the coupon or not.</a:t>
+              <a:t>With </a:t>
+            </a:r>
+            <a:r>
+              <a:rPr lang="en-IN" dirty="0" smtClean="0">
+                <a:solidFill>
+                  <a:srgbClr val="92D050"/>
+                </a:solidFill>
+              </a:rPr>
+              <a:t>77.4% </a:t>
+            </a:r>
+            <a:r>
+              <a:rPr lang="en-IN" dirty="0" smtClean="0"/>
+              <a:t>Accuracy we can now predict if the customer will accept the coupon or not.</a:t>
             </a:r>
           </a:p>
           <a:p>
@@ -24463,7 +25088,11 @@
           <a:p>
             <a:r>
               <a:rPr lang="en-IN" dirty="0" smtClean="0"/>
-              <a:t>We have used </a:t>
+              <a:t>After Hyper Parameter Tuning we </a:t>
+            </a:r>
+            <a:r>
+              <a:rPr lang="en-IN" dirty="0" smtClean="0"/>
+              <a:t>have used </a:t>
             </a:r>
             <a:r>
               <a:rPr lang="en-IN" dirty="0" err="1" smtClean="0"/>
@@ -24935,7 +25564,7 @@
 </p:sld>
 </file>
 
-<file path=ppt/slides/slide28.xml><?xml version="1.0" encoding="utf-8"?>
+<file path=ppt/slides/slide29.xml><?xml version="1.0" encoding="utf-8"?>
 <p:sld xmlns:a="http://schemas.openxmlformats.org/drawingml/2006/main" xmlns:r="http://schemas.openxmlformats.org/officeDocument/2006/relationships" xmlns:p="http://schemas.openxmlformats.org/presentationml/2006/main">
   <p:cSld>
     <p:spTree>
@@ -25259,15 +25888,7 @@
           <a:p>
             <a:r>
               <a:rPr lang="en-IN" dirty="0" smtClean="0"/>
-              <a:t>We have </a:t>
-            </a:r>
-            <a:r>
-              <a:rPr lang="en-IN" dirty="0" smtClean="0"/>
-              <a:t>24 </a:t>
-            </a:r>
-            <a:r>
-              <a:rPr lang="en-IN" dirty="0" smtClean="0"/>
-              <a:t>variables and 12684 observations in our dataset.</a:t>
+              <a:t>We have 24 variables and 12684 observations in our dataset.</a:t>
             </a:r>
           </a:p>
         </p:txBody>
@@ -25378,15 +25999,33 @@
                                   </p:childTnLst>
                                 </p:cTn>
                               </p:par>
+                            </p:childTnLst>
+                          </p:cTn>
+                        </p:par>
+                      </p:childTnLst>
+                    </p:cTn>
+                  </p:par>
+                  <p:par>
+                    <p:cTn id="9" fill="hold">
+                      <p:stCondLst>
+                        <p:cond delay="indefinite"/>
+                      </p:stCondLst>
+                      <p:childTnLst>
+                        <p:par>
+                          <p:cTn id="10" fill="hold">
+                            <p:stCondLst>
+                              <p:cond delay="0"/>
+                            </p:stCondLst>
+                            <p:childTnLst>
                               <p:par>
-                                <p:cTn id="9" presetID="2" presetClass="entr" presetSubtype="4" fill="hold" nodeType="withEffect">
+                                <p:cTn id="11" presetID="2" presetClass="entr" presetSubtype="4" fill="hold" nodeType="clickEffect">
                                   <p:stCondLst>
                                     <p:cond delay="0"/>
                                   </p:stCondLst>
                                   <p:childTnLst>
                                     <p:set>
                                       <p:cBhvr>
-                                        <p:cTn id="10" dur="1" fill="hold">
+                                        <p:cTn id="12" dur="1" fill="hold">
                                           <p:stCondLst>
                                             <p:cond delay="0"/>
                                           </p:stCondLst>
@@ -25404,7 +26043,7 @@
                                     </p:set>
                                     <p:anim calcmode="lin" valueType="num">
                                       <p:cBhvr additive="base">
-                                        <p:cTn id="11" dur="500" fill="hold"/>
+                                        <p:cTn id="13" dur="500" fill="hold"/>
                                         <p:tgtEl>
                                           <p:spTgt spid="10"/>
                                         </p:tgtEl>
@@ -25427,7 +26066,7 @@
                                     </p:anim>
                                     <p:anim calcmode="lin" valueType="num">
                                       <p:cBhvr additive="base">
-                                        <p:cTn id="12" dur="500" fill="hold"/>
+                                        <p:cTn id="14" dur="500" fill="hold"/>
                                         <p:tgtEl>
                                           <p:spTgt spid="10"/>
                                         </p:tgtEl>
@@ -25458,26 +26097,26 @@
                     </p:cTn>
                   </p:par>
                   <p:par>
-                    <p:cTn id="13" fill="hold">
+                    <p:cTn id="15" fill="hold">
                       <p:stCondLst>
                         <p:cond delay="indefinite"/>
                       </p:stCondLst>
                       <p:childTnLst>
                         <p:par>
-                          <p:cTn id="14" fill="hold">
+                          <p:cTn id="16" fill="hold">
                             <p:stCondLst>
                               <p:cond delay="0"/>
                             </p:stCondLst>
                             <p:childTnLst>
                               <p:par>
-                                <p:cTn id="15" presetID="2" presetClass="entr" presetSubtype="4" fill="hold" grpId="0" nodeType="clickEffect">
+                                <p:cTn id="17" presetID="2" presetClass="entr" presetSubtype="4" fill="hold" grpId="0" nodeType="clickEffect">
                                   <p:stCondLst>
                                     <p:cond delay="0"/>
                                   </p:stCondLst>
                                   <p:childTnLst>
                                     <p:set>
                                       <p:cBhvr>
-                                        <p:cTn id="16" dur="1" fill="hold">
+                                        <p:cTn id="18" dur="1" fill="hold">
                                           <p:stCondLst>
                                             <p:cond delay="0"/>
                                           </p:stCondLst>
@@ -25499,7 +26138,7 @@
                                     </p:set>
                                     <p:anim calcmode="lin" valueType="num">
                                       <p:cBhvr additive="base">
-                                        <p:cTn id="17" dur="500" fill="hold"/>
+                                        <p:cTn id="19" dur="500" fill="hold"/>
                                         <p:tgtEl>
                                           <p:spTgt spid="11">
                                             <p:txEl>
@@ -25526,7 +26165,7 @@
                                     </p:anim>
                                     <p:anim calcmode="lin" valueType="num">
                                       <p:cBhvr additive="base">
-                                        <p:cTn id="18" dur="500" fill="hold"/>
+                                        <p:cTn id="20" dur="500" fill="hold"/>
                                         <p:tgtEl>
                                           <p:spTgt spid="11">
                                             <p:txEl>
@@ -26550,11 +27189,7 @@
           <a:p>
             <a:r>
               <a:rPr lang="en-IN" dirty="0" smtClean="0"/>
-              <a:t>Carryout and Takeaway coupons and when </a:t>
-            </a:r>
-            <a:r>
-              <a:rPr lang="en-IN" dirty="0" smtClean="0"/>
-              <a:t>the Restaurant coupons average expense of customer </a:t>
+              <a:t>Carryout and Takeaway coupons and when the Restaurant coupons average expense of customer </a:t>
             </a:r>
             <a:r>
               <a:rPr lang="en-IN" dirty="0"/>
@@ -26574,11 +27209,7 @@
           <a:p>
             <a:r>
               <a:rPr lang="en-IN" dirty="0" smtClean="0"/>
-              <a:t>Whereas Coffee house coupons are 50-50 </a:t>
-            </a:r>
-            <a:r>
-              <a:rPr lang="en-IN" dirty="0" smtClean="0"/>
-              <a:t>split</a:t>
+              <a:t>Whereas Coffee house coupons are 50-50 split</a:t>
             </a:r>
           </a:p>
           <a:p>
@@ -27591,15 +28222,7 @@
             </a:r>
             <a:r>
               <a:rPr lang="en-IN" dirty="0" smtClean="0"/>
-              <a:t> </a:t>
-            </a:r>
-            <a:r>
-              <a:rPr lang="en-IN" dirty="0" smtClean="0"/>
-              <a:t>is more likely to accept the </a:t>
-            </a:r>
-            <a:r>
-              <a:rPr lang="en-IN" dirty="0" smtClean="0"/>
-              <a:t>coupon.</a:t>
+              <a:t> is more likely to accept the coupon.</a:t>
             </a:r>
           </a:p>
           <a:p>
@@ -27607,7 +28230,6 @@
               <a:rPr lang="en-IN" dirty="0" smtClean="0"/>
               <a:t>Used One-Hot encoding for this feature.</a:t>
             </a:r>
-            <a:endParaRPr lang="en-IN" dirty="0" smtClean="0"/>
           </a:p>
         </p:txBody>
       </p:sp>
@@ -28374,19 +28996,7 @@
           <a:p>
             <a:r>
               <a:rPr lang="en-IN" dirty="0" smtClean="0"/>
-              <a:t>When the weather is sunny and temperature is high, customer is more likely to accept the </a:t>
-            </a:r>
-            <a:r>
-              <a:rPr lang="en-IN" dirty="0" smtClean="0"/>
-              <a:t>coupon. And </a:t>
-            </a:r>
-            <a:r>
-              <a:rPr lang="en-IN" dirty="0" smtClean="0"/>
-              <a:t>we can see when the weather is rainy or snowy the customer is more likely to reject the </a:t>
-            </a:r>
-            <a:r>
-              <a:rPr lang="en-IN" dirty="0" smtClean="0"/>
-              <a:t>coupons.</a:t>
+              <a:t>When the weather is sunny and temperature is high, customer is more likely to accept the coupon. And we can see when the weather is rainy or snowy the customer is more likely to reject the coupons.</a:t>
             </a:r>
           </a:p>
           <a:p>
@@ -29709,13 +30319,8 @@
           <a:p>
             <a:r>
               <a:rPr lang="en-IN" dirty="0" smtClean="0"/>
-              <a:t>We should not use label encoder because we can’t say that one occupation is better than </a:t>
+              <a:t>We should not use label encoder because we can’t say that one occupation is better than other.</a:t>
             </a:r>
-            <a:r>
-              <a:rPr lang="en-IN" dirty="0" smtClean="0"/>
-              <a:t>other.</a:t>
-            </a:r>
-            <a:endParaRPr lang="en-IN" dirty="0" smtClean="0"/>
           </a:p>
           <a:p>
             <a:r>
@@ -30782,7 +31387,6 @@
               <a:rPr lang="en-IN" dirty="0" smtClean="0"/>
               <a:t>I have used Label encoding starting from less than $12500 as 0.</a:t>
             </a:r>
-            <a:endParaRPr lang="en-IN" dirty="0" smtClean="0"/>
           </a:p>
         </p:txBody>
       </p:sp>

</xml_diff>